<commit_message>
Parte final para a qualificação
</commit_message>
<xml_diff>
--- a/2_ArtigosDesenvolvimentoMetodologia/pesquisa_20082019/processo_metodologia_cientifica.pptx
+++ b/2_ArtigosDesenvolvimentoMetodologia/pesquisa_20082019/processo_metodologia_cientifica.pptx
@@ -4,9 +4,14 @@
   <p:sldMasterIdLst>
     <p:sldMasterId id="2147483648" r:id="rId1"/>
   </p:sldMasterIdLst>
+  <p:notesMasterIdLst>
+    <p:notesMasterId r:id="rId6"/>
+  </p:notesMasterIdLst>
   <p:sldIdLst>
     <p:sldId id="256" r:id="rId2"/>
     <p:sldId id="257" r:id="rId3"/>
+    <p:sldId id="258" r:id="rId4"/>
+    <p:sldId id="259" r:id="rId5"/>
   </p:sldIdLst>
   <p:sldSz cx="12192000" cy="6858000"/>
   <p:notesSz cx="6858000" cy="9144000"/>
@@ -106,6 +111,607 @@
     </a:lvl9pPr>
   </p:defaultTextStyle>
 </p:presentation>
+</file>
+
+<file path=ppt/notesMasters/notesMaster1.xml><?xml version="1.0" encoding="utf-8"?>
+<p:notesMaster xmlns:a="http://schemas.openxmlformats.org/drawingml/2006/main" xmlns:r="http://schemas.openxmlformats.org/officeDocument/2006/relationships" xmlns:p="http://schemas.openxmlformats.org/presentationml/2006/main">
+  <p:cSld>
+    <p:bg>
+      <p:bgRef idx="1001">
+        <a:schemeClr val="bg1"/>
+      </p:bgRef>
+    </p:bg>
+    <p:spTree>
+      <p:nvGrpSpPr>
+        <p:cNvPr id="1" name=""/>
+        <p:cNvGrpSpPr/>
+        <p:nvPr/>
+      </p:nvGrpSpPr>
+      <p:grpSpPr>
+        <a:xfrm>
+          <a:off x="0" y="0"/>
+          <a:ext cx="0" cy="0"/>
+          <a:chOff x="0" y="0"/>
+          <a:chExt cx="0" cy="0"/>
+        </a:xfrm>
+      </p:grpSpPr>
+      <p:sp>
+        <p:nvSpPr>
+          <p:cNvPr id="2" name="Espaço Reservado para Cabeçalho 1"/>
+          <p:cNvSpPr>
+            <a:spLocks noGrp="1"/>
+          </p:cNvSpPr>
+          <p:nvPr>
+            <p:ph type="hdr" sz="quarter"/>
+          </p:nvPr>
+        </p:nvSpPr>
+        <p:spPr>
+          <a:xfrm>
+            <a:off x="0" y="0"/>
+            <a:ext cx="2971800" cy="458788"/>
+          </a:xfrm>
+          <a:prstGeom prst="rect">
+            <a:avLst/>
+          </a:prstGeom>
+        </p:spPr>
+        <p:txBody>
+          <a:bodyPr vert="horz" lIns="91440" tIns="45720" rIns="91440" bIns="45720" rtlCol="0"/>
+          <a:lstStyle>
+            <a:lvl1pPr algn="l">
+              <a:defRPr sz="1200"/>
+            </a:lvl1pPr>
+          </a:lstStyle>
+          <a:p>
+            <a:endParaRPr lang="pt-BR"/>
+          </a:p>
+        </p:txBody>
+      </p:sp>
+      <p:sp>
+        <p:nvSpPr>
+          <p:cNvPr id="3" name="Espaço Reservado para Data 2"/>
+          <p:cNvSpPr>
+            <a:spLocks noGrp="1"/>
+          </p:cNvSpPr>
+          <p:nvPr>
+            <p:ph type="dt" idx="1"/>
+          </p:nvPr>
+        </p:nvSpPr>
+        <p:spPr>
+          <a:xfrm>
+            <a:off x="3884613" y="0"/>
+            <a:ext cx="2971800" cy="458788"/>
+          </a:xfrm>
+          <a:prstGeom prst="rect">
+            <a:avLst/>
+          </a:prstGeom>
+        </p:spPr>
+        <p:txBody>
+          <a:bodyPr vert="horz" lIns="91440" tIns="45720" rIns="91440" bIns="45720" rtlCol="0"/>
+          <a:lstStyle>
+            <a:lvl1pPr algn="r">
+              <a:defRPr sz="1200"/>
+            </a:lvl1pPr>
+          </a:lstStyle>
+          <a:p>
+            <a:fld id="{227BEC64-916B-8E4E-B417-C07C7A99F0B2}" type="datetimeFigureOut">
+              <a:rPr lang="pt-BR" smtClean="0"/>
+              <a:t>22/11/2019</a:t>
+            </a:fld>
+            <a:endParaRPr lang="pt-BR"/>
+          </a:p>
+        </p:txBody>
+      </p:sp>
+      <p:sp>
+        <p:nvSpPr>
+          <p:cNvPr id="4" name="Espaço Reservado para Imagem de Slide 3"/>
+          <p:cNvSpPr>
+            <a:spLocks noGrp="1" noRot="1" noChangeAspect="1"/>
+          </p:cNvSpPr>
+          <p:nvPr>
+            <p:ph type="sldImg" idx="2"/>
+          </p:nvPr>
+        </p:nvSpPr>
+        <p:spPr>
+          <a:xfrm>
+            <a:off x="685800" y="1143000"/>
+            <a:ext cx="5486400" cy="3086100"/>
+          </a:xfrm>
+          <a:prstGeom prst="rect">
+            <a:avLst/>
+          </a:prstGeom>
+          <a:noFill/>
+          <a:ln w="12700">
+            <a:solidFill>
+              <a:prstClr val="black"/>
+            </a:solidFill>
+          </a:ln>
+        </p:spPr>
+        <p:txBody>
+          <a:bodyPr vert="horz" lIns="91440" tIns="45720" rIns="91440" bIns="45720" rtlCol="0" anchor="ctr"/>
+          <a:lstStyle/>
+          <a:p>
+            <a:endParaRPr lang="pt-BR"/>
+          </a:p>
+        </p:txBody>
+      </p:sp>
+      <p:sp>
+        <p:nvSpPr>
+          <p:cNvPr id="5" name="Espaço Reservado para Anotações 4"/>
+          <p:cNvSpPr>
+            <a:spLocks noGrp="1"/>
+          </p:cNvSpPr>
+          <p:nvPr>
+            <p:ph type="body" sz="quarter" idx="3"/>
+          </p:nvPr>
+        </p:nvSpPr>
+        <p:spPr>
+          <a:xfrm>
+            <a:off x="685800" y="4400550"/>
+            <a:ext cx="5486400" cy="3600450"/>
+          </a:xfrm>
+          <a:prstGeom prst="rect">
+            <a:avLst/>
+          </a:prstGeom>
+        </p:spPr>
+        <p:txBody>
+          <a:bodyPr vert="horz" lIns="91440" tIns="45720" rIns="91440" bIns="45720" rtlCol="0"/>
+          <a:lstStyle/>
+          <a:p>
+            <a:pPr lvl="0"/>
+            <a:r>
+              <a:rPr lang="pt-BR"/>
+              <a:t>Clique para editar os estilos de texto Mestres</a:t>
+            </a:r>
+          </a:p>
+          <a:p>
+            <a:pPr lvl="1"/>
+            <a:r>
+              <a:rPr lang="pt-BR"/>
+              <a:t>Segundo nível</a:t>
+            </a:r>
+          </a:p>
+          <a:p>
+            <a:pPr lvl="2"/>
+            <a:r>
+              <a:rPr lang="pt-BR"/>
+              <a:t>Terceiro nível</a:t>
+            </a:r>
+          </a:p>
+          <a:p>
+            <a:pPr lvl="3"/>
+            <a:r>
+              <a:rPr lang="pt-BR"/>
+              <a:t>Quarto nível</a:t>
+            </a:r>
+          </a:p>
+          <a:p>
+            <a:pPr lvl="4"/>
+            <a:r>
+              <a:rPr lang="pt-BR"/>
+              <a:t>Quinto nível</a:t>
+            </a:r>
+          </a:p>
+        </p:txBody>
+      </p:sp>
+      <p:sp>
+        <p:nvSpPr>
+          <p:cNvPr id="6" name="Espaço Reservado para Rodapé 5"/>
+          <p:cNvSpPr>
+            <a:spLocks noGrp="1"/>
+          </p:cNvSpPr>
+          <p:nvPr>
+            <p:ph type="ftr" sz="quarter" idx="4"/>
+          </p:nvPr>
+        </p:nvSpPr>
+        <p:spPr>
+          <a:xfrm>
+            <a:off x="0" y="8685213"/>
+            <a:ext cx="2971800" cy="458787"/>
+          </a:xfrm>
+          <a:prstGeom prst="rect">
+            <a:avLst/>
+          </a:prstGeom>
+        </p:spPr>
+        <p:txBody>
+          <a:bodyPr vert="horz" lIns="91440" tIns="45720" rIns="91440" bIns="45720" rtlCol="0" anchor="b"/>
+          <a:lstStyle>
+            <a:lvl1pPr algn="l">
+              <a:defRPr sz="1200"/>
+            </a:lvl1pPr>
+          </a:lstStyle>
+          <a:p>
+            <a:endParaRPr lang="pt-BR"/>
+          </a:p>
+        </p:txBody>
+      </p:sp>
+      <p:sp>
+        <p:nvSpPr>
+          <p:cNvPr id="7" name="Espaço Reservado para Número de Slide 6"/>
+          <p:cNvSpPr>
+            <a:spLocks noGrp="1"/>
+          </p:cNvSpPr>
+          <p:nvPr>
+            <p:ph type="sldNum" sz="quarter" idx="5"/>
+          </p:nvPr>
+        </p:nvSpPr>
+        <p:spPr>
+          <a:xfrm>
+            <a:off x="3884613" y="8685213"/>
+            <a:ext cx="2971800" cy="458787"/>
+          </a:xfrm>
+          <a:prstGeom prst="rect">
+            <a:avLst/>
+          </a:prstGeom>
+        </p:spPr>
+        <p:txBody>
+          <a:bodyPr vert="horz" lIns="91440" tIns="45720" rIns="91440" bIns="45720" rtlCol="0" anchor="b"/>
+          <a:lstStyle>
+            <a:lvl1pPr algn="r">
+              <a:defRPr sz="1200"/>
+            </a:lvl1pPr>
+          </a:lstStyle>
+          <a:p>
+            <a:fld id="{7D0FBB13-2800-D846-BBD8-A096329BFC60}" type="slidenum">
+              <a:rPr lang="pt-BR" smtClean="0"/>
+              <a:t>‹nº›</a:t>
+            </a:fld>
+            <a:endParaRPr lang="pt-BR"/>
+          </a:p>
+        </p:txBody>
+      </p:sp>
+    </p:spTree>
+    <p:extLst>
+      <p:ext uri="{BB962C8B-B14F-4D97-AF65-F5344CB8AC3E}">
+        <p14:creationId xmlns:p14="http://schemas.microsoft.com/office/powerpoint/2010/main" val="1351640238"/>
+      </p:ext>
+    </p:extLst>
+  </p:cSld>
+  <p:clrMap bg1="lt1" tx1="dk1" bg2="lt2" tx2="dk2" accent1="accent1" accent2="accent2" accent3="accent3" accent4="accent4" accent5="accent5" accent6="accent6" hlink="hlink" folHlink="folHlink"/>
+  <p:notesStyle>
+    <a:lvl1pPr marL="0" algn="l" defTabSz="914400" rtl="0" eaLnBrk="1" latinLnBrk="0" hangingPunct="1">
+      <a:defRPr sz="1200" kern="1200">
+        <a:solidFill>
+          <a:schemeClr val="tx1"/>
+        </a:solidFill>
+        <a:latin typeface="+mn-lt"/>
+        <a:ea typeface="+mn-ea"/>
+        <a:cs typeface="+mn-cs"/>
+      </a:defRPr>
+    </a:lvl1pPr>
+    <a:lvl2pPr marL="457200" algn="l" defTabSz="914400" rtl="0" eaLnBrk="1" latinLnBrk="0" hangingPunct="1">
+      <a:defRPr sz="1200" kern="1200">
+        <a:solidFill>
+          <a:schemeClr val="tx1"/>
+        </a:solidFill>
+        <a:latin typeface="+mn-lt"/>
+        <a:ea typeface="+mn-ea"/>
+        <a:cs typeface="+mn-cs"/>
+      </a:defRPr>
+    </a:lvl2pPr>
+    <a:lvl3pPr marL="914400" algn="l" defTabSz="914400" rtl="0" eaLnBrk="1" latinLnBrk="0" hangingPunct="1">
+      <a:defRPr sz="1200" kern="1200">
+        <a:solidFill>
+          <a:schemeClr val="tx1"/>
+        </a:solidFill>
+        <a:latin typeface="+mn-lt"/>
+        <a:ea typeface="+mn-ea"/>
+        <a:cs typeface="+mn-cs"/>
+      </a:defRPr>
+    </a:lvl3pPr>
+    <a:lvl4pPr marL="1371600" algn="l" defTabSz="914400" rtl="0" eaLnBrk="1" latinLnBrk="0" hangingPunct="1">
+      <a:defRPr sz="1200" kern="1200">
+        <a:solidFill>
+          <a:schemeClr val="tx1"/>
+        </a:solidFill>
+        <a:latin typeface="+mn-lt"/>
+        <a:ea typeface="+mn-ea"/>
+        <a:cs typeface="+mn-cs"/>
+      </a:defRPr>
+    </a:lvl4pPr>
+    <a:lvl5pPr marL="1828800" algn="l" defTabSz="914400" rtl="0" eaLnBrk="1" latinLnBrk="0" hangingPunct="1">
+      <a:defRPr sz="1200" kern="1200">
+        <a:solidFill>
+          <a:schemeClr val="tx1"/>
+        </a:solidFill>
+        <a:latin typeface="+mn-lt"/>
+        <a:ea typeface="+mn-ea"/>
+        <a:cs typeface="+mn-cs"/>
+      </a:defRPr>
+    </a:lvl5pPr>
+    <a:lvl6pPr marL="2286000" algn="l" defTabSz="914400" rtl="0" eaLnBrk="1" latinLnBrk="0" hangingPunct="1">
+      <a:defRPr sz="1200" kern="1200">
+        <a:solidFill>
+          <a:schemeClr val="tx1"/>
+        </a:solidFill>
+        <a:latin typeface="+mn-lt"/>
+        <a:ea typeface="+mn-ea"/>
+        <a:cs typeface="+mn-cs"/>
+      </a:defRPr>
+    </a:lvl6pPr>
+    <a:lvl7pPr marL="2743200" algn="l" defTabSz="914400" rtl="0" eaLnBrk="1" latinLnBrk="0" hangingPunct="1">
+      <a:defRPr sz="1200" kern="1200">
+        <a:solidFill>
+          <a:schemeClr val="tx1"/>
+        </a:solidFill>
+        <a:latin typeface="+mn-lt"/>
+        <a:ea typeface="+mn-ea"/>
+        <a:cs typeface="+mn-cs"/>
+      </a:defRPr>
+    </a:lvl7pPr>
+    <a:lvl8pPr marL="3200400" algn="l" defTabSz="914400" rtl="0" eaLnBrk="1" latinLnBrk="0" hangingPunct="1">
+      <a:defRPr sz="1200" kern="1200">
+        <a:solidFill>
+          <a:schemeClr val="tx1"/>
+        </a:solidFill>
+        <a:latin typeface="+mn-lt"/>
+        <a:ea typeface="+mn-ea"/>
+        <a:cs typeface="+mn-cs"/>
+      </a:defRPr>
+    </a:lvl8pPr>
+    <a:lvl9pPr marL="3657600" algn="l" defTabSz="914400" rtl="0" eaLnBrk="1" latinLnBrk="0" hangingPunct="1">
+      <a:defRPr sz="1200" kern="1200">
+        <a:solidFill>
+          <a:schemeClr val="tx1"/>
+        </a:solidFill>
+        <a:latin typeface="+mn-lt"/>
+        <a:ea typeface="+mn-ea"/>
+        <a:cs typeface="+mn-cs"/>
+      </a:defRPr>
+    </a:lvl9pPr>
+  </p:notesStyle>
+</p:notesMaster>
+</file>
+
+<file path=ppt/notesSlides/notesSlide1.xml><?xml version="1.0" encoding="utf-8"?>
+<p:notes xmlns:a="http://schemas.openxmlformats.org/drawingml/2006/main" xmlns:r="http://schemas.openxmlformats.org/officeDocument/2006/relationships" xmlns:p="http://schemas.openxmlformats.org/presentationml/2006/main">
+  <p:cSld>
+    <p:spTree>
+      <p:nvGrpSpPr>
+        <p:cNvPr id="1" name=""/>
+        <p:cNvGrpSpPr/>
+        <p:nvPr/>
+      </p:nvGrpSpPr>
+      <p:grpSpPr>
+        <a:xfrm>
+          <a:off x="0" y="0"/>
+          <a:ext cx="0" cy="0"/>
+          <a:chOff x="0" y="0"/>
+          <a:chExt cx="0" cy="0"/>
+        </a:xfrm>
+      </p:grpSpPr>
+      <p:sp>
+        <p:nvSpPr>
+          <p:cNvPr id="2" name="Espaço Reservado para Imagem de Slide 1"/>
+          <p:cNvSpPr>
+            <a:spLocks noGrp="1" noRot="1" noChangeAspect="1"/>
+          </p:cNvSpPr>
+          <p:nvPr>
+            <p:ph type="sldImg"/>
+          </p:nvPr>
+        </p:nvSpPr>
+        <p:spPr/>
+      </p:sp>
+      <p:sp>
+        <p:nvSpPr>
+          <p:cNvPr id="3" name="Espaço Reservado para Anotações 2"/>
+          <p:cNvSpPr>
+            <a:spLocks noGrp="1"/>
+          </p:cNvSpPr>
+          <p:nvPr>
+            <p:ph type="body" idx="1"/>
+          </p:nvPr>
+        </p:nvSpPr>
+        <p:spPr/>
+        <p:txBody>
+          <a:bodyPr/>
+          <a:lstStyle/>
+          <a:p>
+            <a:endParaRPr lang="pt-BR"/>
+          </a:p>
+        </p:txBody>
+      </p:sp>
+      <p:sp>
+        <p:nvSpPr>
+          <p:cNvPr id="4" name="Espaço Reservado para Número de Slide 3"/>
+          <p:cNvSpPr>
+            <a:spLocks noGrp="1"/>
+          </p:cNvSpPr>
+          <p:nvPr>
+            <p:ph type="sldNum" sz="quarter" idx="5"/>
+          </p:nvPr>
+        </p:nvSpPr>
+        <p:spPr/>
+        <p:txBody>
+          <a:bodyPr/>
+          <a:lstStyle/>
+          <a:p>
+            <a:fld id="{7D0FBB13-2800-D846-BBD8-A096329BFC60}" type="slidenum">
+              <a:rPr lang="pt-BR" smtClean="0"/>
+              <a:t>2</a:t>
+            </a:fld>
+            <a:endParaRPr lang="pt-BR"/>
+          </a:p>
+        </p:txBody>
+      </p:sp>
+    </p:spTree>
+    <p:extLst>
+      <p:ext uri="{BB962C8B-B14F-4D97-AF65-F5344CB8AC3E}">
+        <p14:creationId xmlns:p14="http://schemas.microsoft.com/office/powerpoint/2010/main" val="3148683523"/>
+      </p:ext>
+    </p:extLst>
+  </p:cSld>
+  <p:clrMapOvr>
+    <a:masterClrMapping/>
+  </p:clrMapOvr>
+</p:notes>
+</file>
+
+<file path=ppt/notesSlides/notesSlide2.xml><?xml version="1.0" encoding="utf-8"?>
+<p:notes xmlns:a="http://schemas.openxmlformats.org/drawingml/2006/main" xmlns:r="http://schemas.openxmlformats.org/officeDocument/2006/relationships" xmlns:p="http://schemas.openxmlformats.org/presentationml/2006/main">
+  <p:cSld>
+    <p:spTree>
+      <p:nvGrpSpPr>
+        <p:cNvPr id="1" name=""/>
+        <p:cNvGrpSpPr/>
+        <p:nvPr/>
+      </p:nvGrpSpPr>
+      <p:grpSpPr>
+        <a:xfrm>
+          <a:off x="0" y="0"/>
+          <a:ext cx="0" cy="0"/>
+          <a:chOff x="0" y="0"/>
+          <a:chExt cx="0" cy="0"/>
+        </a:xfrm>
+      </p:grpSpPr>
+      <p:sp>
+        <p:nvSpPr>
+          <p:cNvPr id="2" name="Espaço Reservado para Imagem de Slide 1"/>
+          <p:cNvSpPr>
+            <a:spLocks noGrp="1" noRot="1" noChangeAspect="1"/>
+          </p:cNvSpPr>
+          <p:nvPr>
+            <p:ph type="sldImg"/>
+          </p:nvPr>
+        </p:nvSpPr>
+        <p:spPr/>
+      </p:sp>
+      <p:sp>
+        <p:nvSpPr>
+          <p:cNvPr id="3" name="Espaço Reservado para Anotações 2"/>
+          <p:cNvSpPr>
+            <a:spLocks noGrp="1"/>
+          </p:cNvSpPr>
+          <p:nvPr>
+            <p:ph type="body" idx="1"/>
+          </p:nvPr>
+        </p:nvSpPr>
+        <p:spPr/>
+        <p:txBody>
+          <a:bodyPr/>
+          <a:lstStyle/>
+          <a:p>
+            <a:endParaRPr lang="pt-BR"/>
+          </a:p>
+        </p:txBody>
+      </p:sp>
+      <p:sp>
+        <p:nvSpPr>
+          <p:cNvPr id="4" name="Espaço Reservado para Número de Slide 3"/>
+          <p:cNvSpPr>
+            <a:spLocks noGrp="1"/>
+          </p:cNvSpPr>
+          <p:nvPr>
+            <p:ph type="sldNum" sz="quarter" idx="5"/>
+          </p:nvPr>
+        </p:nvSpPr>
+        <p:spPr/>
+        <p:txBody>
+          <a:bodyPr/>
+          <a:lstStyle/>
+          <a:p>
+            <a:fld id="{7D0FBB13-2800-D846-BBD8-A096329BFC60}" type="slidenum">
+              <a:rPr lang="pt-BR" smtClean="0"/>
+              <a:t>3</a:t>
+            </a:fld>
+            <a:endParaRPr lang="pt-BR"/>
+          </a:p>
+        </p:txBody>
+      </p:sp>
+    </p:spTree>
+    <p:extLst>
+      <p:ext uri="{BB962C8B-B14F-4D97-AF65-F5344CB8AC3E}">
+        <p14:creationId xmlns:p14="http://schemas.microsoft.com/office/powerpoint/2010/main" val="3177034900"/>
+      </p:ext>
+    </p:extLst>
+  </p:cSld>
+  <p:clrMapOvr>
+    <a:masterClrMapping/>
+  </p:clrMapOvr>
+</p:notes>
+</file>
+
+<file path=ppt/notesSlides/notesSlide3.xml><?xml version="1.0" encoding="utf-8"?>
+<p:notes xmlns:a="http://schemas.openxmlformats.org/drawingml/2006/main" xmlns:r="http://schemas.openxmlformats.org/officeDocument/2006/relationships" xmlns:p="http://schemas.openxmlformats.org/presentationml/2006/main">
+  <p:cSld>
+    <p:spTree>
+      <p:nvGrpSpPr>
+        <p:cNvPr id="1" name=""/>
+        <p:cNvGrpSpPr/>
+        <p:nvPr/>
+      </p:nvGrpSpPr>
+      <p:grpSpPr>
+        <a:xfrm>
+          <a:off x="0" y="0"/>
+          <a:ext cx="0" cy="0"/>
+          <a:chOff x="0" y="0"/>
+          <a:chExt cx="0" cy="0"/>
+        </a:xfrm>
+      </p:grpSpPr>
+      <p:sp>
+        <p:nvSpPr>
+          <p:cNvPr id="2" name="Espaço Reservado para Imagem de Slide 1"/>
+          <p:cNvSpPr>
+            <a:spLocks noGrp="1" noRot="1" noChangeAspect="1"/>
+          </p:cNvSpPr>
+          <p:nvPr>
+            <p:ph type="sldImg"/>
+          </p:nvPr>
+        </p:nvSpPr>
+        <p:spPr/>
+      </p:sp>
+      <p:sp>
+        <p:nvSpPr>
+          <p:cNvPr id="3" name="Espaço Reservado para Anotações 2"/>
+          <p:cNvSpPr>
+            <a:spLocks noGrp="1"/>
+          </p:cNvSpPr>
+          <p:nvPr>
+            <p:ph type="body" idx="1"/>
+          </p:nvPr>
+        </p:nvSpPr>
+        <p:spPr/>
+        <p:txBody>
+          <a:bodyPr/>
+          <a:lstStyle/>
+          <a:p>
+            <a:endParaRPr lang="pt-BR"/>
+          </a:p>
+        </p:txBody>
+      </p:sp>
+      <p:sp>
+        <p:nvSpPr>
+          <p:cNvPr id="4" name="Espaço Reservado para Número de Slide 3"/>
+          <p:cNvSpPr>
+            <a:spLocks noGrp="1"/>
+          </p:cNvSpPr>
+          <p:nvPr>
+            <p:ph type="sldNum" sz="quarter" idx="5"/>
+          </p:nvPr>
+        </p:nvSpPr>
+        <p:spPr/>
+        <p:txBody>
+          <a:bodyPr/>
+          <a:lstStyle/>
+          <a:p>
+            <a:fld id="{7D0FBB13-2800-D846-BBD8-A096329BFC60}" type="slidenum">
+              <a:rPr lang="pt-BR" smtClean="0"/>
+              <a:t>4</a:t>
+            </a:fld>
+            <a:endParaRPr lang="pt-BR"/>
+          </a:p>
+        </p:txBody>
+      </p:sp>
+    </p:spTree>
+    <p:extLst>
+      <p:ext uri="{BB962C8B-B14F-4D97-AF65-F5344CB8AC3E}">
+        <p14:creationId xmlns:p14="http://schemas.microsoft.com/office/powerpoint/2010/main" val="2184465750"/>
+      </p:ext>
+    </p:extLst>
+  </p:cSld>
+  <p:clrMapOvr>
+    <a:masterClrMapping/>
+  </p:clrMapOvr>
+</p:notes>
 </file>
 
 <file path=ppt/slideLayouts/slideLayout1.xml><?xml version="1.0" encoding="utf-8"?>
@@ -3343,7 +3949,7 @@
           <a:bodyPr/>
           <a:lstStyle/>
           <a:p>
-            <a:endParaRPr lang="pt-BR"/>
+            <a:endParaRPr lang="pt-BR" dirty="0"/>
           </a:p>
         </p:txBody>
       </p:sp>
@@ -3417,10 +4023,10 @@
           <p:nvPr/>
         </p:nvPicPr>
         <p:blipFill>
-          <a:blip r:embed="rId2">
+          <a:blip r:embed="rId3">
             <a:extLst>
               <a:ext uri="{96DAC541-7B7A-43D3-8B79-37D633B846F1}">
-                <asvg:svgBlip xmlns:asvg="http://schemas.microsoft.com/office/drawing/2016/SVG/main" r:embed="rId3"/>
+                <asvg:svgBlip xmlns:asvg="http://schemas.microsoft.com/office/drawing/2016/SVG/main" r:embed="rId4"/>
               </a:ext>
             </a:extLst>
           </a:blip>
@@ -3453,10 +4059,10 @@
           <p:nvPr/>
         </p:nvPicPr>
         <p:blipFill>
-          <a:blip r:embed="rId2">
+          <a:blip r:embed="rId3">
             <a:extLst>
               <a:ext uri="{96DAC541-7B7A-43D3-8B79-37D633B846F1}">
-                <asvg:svgBlip xmlns:asvg="http://schemas.microsoft.com/office/drawing/2016/SVG/main" r:embed="rId3"/>
+                <asvg:svgBlip xmlns:asvg="http://schemas.microsoft.com/office/drawing/2016/SVG/main" r:embed="rId4"/>
               </a:ext>
             </a:extLst>
           </a:blip>
@@ -3489,10 +4095,10 @@
           <p:nvPr/>
         </p:nvPicPr>
         <p:blipFill>
-          <a:blip r:embed="rId2">
+          <a:blip r:embed="rId3">
             <a:extLst>
               <a:ext uri="{96DAC541-7B7A-43D3-8B79-37D633B846F1}">
-                <asvg:svgBlip xmlns:asvg="http://schemas.microsoft.com/office/drawing/2016/SVG/main" r:embed="rId3"/>
+                <asvg:svgBlip xmlns:asvg="http://schemas.microsoft.com/office/drawing/2016/SVG/main" r:embed="rId4"/>
               </a:ext>
             </a:extLst>
           </a:blip>
@@ -3525,10 +4131,10 @@
           <p:nvPr/>
         </p:nvPicPr>
         <p:blipFill>
-          <a:blip r:embed="rId4">
+          <a:blip r:embed="rId5">
             <a:extLst>
               <a:ext uri="{96DAC541-7B7A-43D3-8B79-37D633B846F1}">
-                <asvg:svgBlip xmlns:asvg="http://schemas.microsoft.com/office/drawing/2016/SVG/main" r:embed="rId5"/>
+                <asvg:svgBlip xmlns:asvg="http://schemas.microsoft.com/office/drawing/2016/SVG/main" r:embed="rId6"/>
               </a:ext>
             </a:extLst>
           </a:blip>
@@ -3561,10 +4167,10 @@
           <p:nvPr/>
         </p:nvPicPr>
         <p:blipFill>
-          <a:blip r:embed="rId6">
+          <a:blip r:embed="rId7">
             <a:extLst>
               <a:ext uri="{96DAC541-7B7A-43D3-8B79-37D633B846F1}">
-                <asvg:svgBlip xmlns:asvg="http://schemas.microsoft.com/office/drawing/2016/SVG/main" r:embed="rId7"/>
+                <asvg:svgBlip xmlns:asvg="http://schemas.microsoft.com/office/drawing/2016/SVG/main" r:embed="rId8"/>
               </a:ext>
             </a:extLst>
           </a:blip>
@@ -3597,10 +4203,10 @@
           <p:nvPr/>
         </p:nvPicPr>
         <p:blipFill>
-          <a:blip r:embed="rId8">
+          <a:blip r:embed="rId9">
             <a:extLst>
               <a:ext uri="{96DAC541-7B7A-43D3-8B79-37D633B846F1}">
-                <asvg:svgBlip xmlns:asvg="http://schemas.microsoft.com/office/drawing/2016/SVG/main" r:embed="rId9"/>
+                <asvg:svgBlip xmlns:asvg="http://schemas.microsoft.com/office/drawing/2016/SVG/main" r:embed="rId10"/>
               </a:ext>
             </a:extLst>
           </a:blip>
@@ -3633,13 +4239,13 @@
           <p:nvPr/>
         </p:nvPicPr>
         <p:blipFill>
-          <a:blip r:embed="rId10">
+          <a:blip r:embed="rId11">
             <a:extLst>
               <a:ext uri="{28A0092B-C50C-407E-A947-70E740481C1C}">
                 <a14:useLocalDpi xmlns:a14="http://schemas.microsoft.com/office/drawing/2010/main" val="0"/>
               </a:ext>
               <a:ext uri="{96DAC541-7B7A-43D3-8B79-37D633B846F1}">
-                <asvg:svgBlip xmlns:asvg="http://schemas.microsoft.com/office/drawing/2016/SVG/main" r:embed="rId11"/>
+                <asvg:svgBlip xmlns:asvg="http://schemas.microsoft.com/office/drawing/2016/SVG/main" r:embed="rId12"/>
               </a:ext>
             </a:extLst>
           </a:blip>
@@ -3672,10 +4278,10 @@
           <p:nvPr/>
         </p:nvPicPr>
         <p:blipFill>
-          <a:blip r:embed="rId8">
+          <a:blip r:embed="rId9">
             <a:extLst>
               <a:ext uri="{96DAC541-7B7A-43D3-8B79-37D633B846F1}">
-                <asvg:svgBlip xmlns:asvg="http://schemas.microsoft.com/office/drawing/2016/SVG/main" r:embed="rId9"/>
+                <asvg:svgBlip xmlns:asvg="http://schemas.microsoft.com/office/drawing/2016/SVG/main" r:embed="rId10"/>
               </a:ext>
             </a:extLst>
           </a:blip>
@@ -3708,10 +4314,10 @@
           <p:nvPr/>
         </p:nvPicPr>
         <p:blipFill>
-          <a:blip r:embed="rId8">
+          <a:blip r:embed="rId9">
             <a:extLst>
               <a:ext uri="{96DAC541-7B7A-43D3-8B79-37D633B846F1}">
-                <asvg:svgBlip xmlns:asvg="http://schemas.microsoft.com/office/drawing/2016/SVG/main" r:embed="rId9"/>
+                <asvg:svgBlip xmlns:asvg="http://schemas.microsoft.com/office/drawing/2016/SVG/main" r:embed="rId10"/>
               </a:ext>
             </a:extLst>
           </a:blip>
@@ -3744,10 +4350,10 @@
           <p:nvPr/>
         </p:nvPicPr>
         <p:blipFill>
-          <a:blip r:embed="rId12">
+          <a:blip r:embed="rId13">
             <a:extLst>
               <a:ext uri="{96DAC541-7B7A-43D3-8B79-37D633B846F1}">
-                <asvg:svgBlip xmlns:asvg="http://schemas.microsoft.com/office/drawing/2016/SVG/main" r:embed="rId13"/>
+                <asvg:svgBlip xmlns:asvg="http://schemas.microsoft.com/office/drawing/2016/SVG/main" r:embed="rId14"/>
               </a:ext>
             </a:extLst>
           </a:blip>
@@ -3780,10 +4386,10 @@
           <p:nvPr/>
         </p:nvPicPr>
         <p:blipFill>
-          <a:blip r:embed="rId14">
+          <a:blip r:embed="rId15">
             <a:extLst>
               <a:ext uri="{96DAC541-7B7A-43D3-8B79-37D633B846F1}">
-                <asvg:svgBlip xmlns:asvg="http://schemas.microsoft.com/office/drawing/2016/SVG/main" r:embed="rId15"/>
+                <asvg:svgBlip xmlns:asvg="http://schemas.microsoft.com/office/drawing/2016/SVG/main" r:embed="rId16"/>
               </a:ext>
             </a:extLst>
           </a:blip>
@@ -4522,6 +5128,3878 @@
     <p:extLst>
       <p:ext uri="{BB962C8B-B14F-4D97-AF65-F5344CB8AC3E}">
         <p14:creationId xmlns:p14="http://schemas.microsoft.com/office/powerpoint/2010/main" val="4092204165"/>
+      </p:ext>
+    </p:extLst>
+  </p:cSld>
+  <p:clrMapOvr>
+    <a:masterClrMapping/>
+  </p:clrMapOvr>
+</p:sld>
+</file>
+
+<file path=ppt/slides/slide3.xml><?xml version="1.0" encoding="utf-8"?>
+<p:sld xmlns:a="http://schemas.openxmlformats.org/drawingml/2006/main" xmlns:r="http://schemas.openxmlformats.org/officeDocument/2006/relationships" xmlns:p="http://schemas.openxmlformats.org/presentationml/2006/main">
+  <p:cSld>
+    <p:spTree>
+      <p:nvGrpSpPr>
+        <p:cNvPr id="1" name=""/>
+        <p:cNvGrpSpPr/>
+        <p:nvPr/>
+      </p:nvGrpSpPr>
+      <p:grpSpPr>
+        <a:xfrm>
+          <a:off x="0" y="0"/>
+          <a:ext cx="0" cy="0"/>
+          <a:chOff x="0" y="0"/>
+          <a:chExt cx="0" cy="0"/>
+        </a:xfrm>
+      </p:grpSpPr>
+      <p:pic>
+        <p:nvPicPr>
+          <p:cNvPr id="5" name="Gráfico 4" descr="Homem">
+            <a:extLst>
+              <a:ext uri="{FF2B5EF4-FFF2-40B4-BE49-F238E27FC236}">
+                <a16:creationId xmlns:a16="http://schemas.microsoft.com/office/drawing/2014/main" id="{DB2EEF8D-E089-EB4C-A67B-279815042145}"/>
+              </a:ext>
+            </a:extLst>
+          </p:cNvPr>
+          <p:cNvPicPr>
+            <a:picLocks noChangeAspect="1"/>
+          </p:cNvPicPr>
+          <p:nvPr/>
+        </p:nvPicPr>
+        <p:blipFill>
+          <a:blip r:embed="rId3">
+            <a:extLst>
+              <a:ext uri="{96DAC541-7B7A-43D3-8B79-37D633B846F1}">
+                <asvg:svgBlip xmlns:asvg="http://schemas.microsoft.com/office/drawing/2016/SVG/main" r:embed="rId4"/>
+              </a:ext>
+            </a:extLst>
+          </a:blip>
+          <a:stretch>
+            <a:fillRect/>
+          </a:stretch>
+        </p:blipFill>
+        <p:spPr>
+          <a:xfrm>
+            <a:off x="5860443" y="302821"/>
+            <a:ext cx="469557" cy="469557"/>
+          </a:xfrm>
+          <a:prstGeom prst="rect">
+            <a:avLst/>
+          </a:prstGeom>
+        </p:spPr>
+      </p:pic>
+      <p:pic>
+        <p:nvPicPr>
+          <p:cNvPr id="7" name="Gráfico 6" descr="Banco">
+            <a:extLst>
+              <a:ext uri="{FF2B5EF4-FFF2-40B4-BE49-F238E27FC236}">
+                <a16:creationId xmlns:a16="http://schemas.microsoft.com/office/drawing/2014/main" id="{697595F5-5062-D04B-8897-7E431C62E912}"/>
+              </a:ext>
+            </a:extLst>
+          </p:cNvPr>
+          <p:cNvPicPr>
+            <a:picLocks noChangeAspect="1"/>
+          </p:cNvPicPr>
+          <p:nvPr/>
+        </p:nvPicPr>
+        <p:blipFill>
+          <a:blip r:embed="rId5">
+            <a:extLst>
+              <a:ext uri="{96DAC541-7B7A-43D3-8B79-37D633B846F1}">
+                <asvg:svgBlip xmlns:asvg="http://schemas.microsoft.com/office/drawing/2016/SVG/main" r:embed="rId6"/>
+              </a:ext>
+            </a:extLst>
+          </a:blip>
+          <a:stretch>
+            <a:fillRect/>
+          </a:stretch>
+        </p:blipFill>
+        <p:spPr>
+          <a:xfrm>
+            <a:off x="3437763" y="1248032"/>
+            <a:ext cx="468000" cy="468000"/>
+          </a:xfrm>
+          <a:prstGeom prst="rect">
+            <a:avLst/>
+          </a:prstGeom>
+        </p:spPr>
+      </p:pic>
+      <p:sp>
+        <p:nvSpPr>
+          <p:cNvPr id="8" name="Oval 7">
+            <a:extLst>
+              <a:ext uri="{FF2B5EF4-FFF2-40B4-BE49-F238E27FC236}">
+                <a16:creationId xmlns:a16="http://schemas.microsoft.com/office/drawing/2014/main" id="{D48A0FCB-94F9-F44A-AB87-1AE7845D7BA1}"/>
+              </a:ext>
+            </a:extLst>
+          </p:cNvPr>
+          <p:cNvSpPr/>
+          <p:nvPr/>
+        </p:nvSpPr>
+        <p:spPr>
+          <a:xfrm>
+            <a:off x="3635763" y="1248032"/>
+            <a:ext cx="72000" cy="72000"/>
+          </a:xfrm>
+          <a:prstGeom prst="ellipse">
+            <a:avLst/>
+          </a:prstGeom>
+          <a:solidFill>
+            <a:schemeClr val="tx1"/>
+          </a:solidFill>
+          <a:ln>
+            <a:solidFill>
+              <a:schemeClr val="tx1"/>
+            </a:solidFill>
+          </a:ln>
+        </p:spPr>
+        <p:style>
+          <a:lnRef idx="2">
+            <a:schemeClr val="accent1">
+              <a:shade val="50000"/>
+            </a:schemeClr>
+          </a:lnRef>
+          <a:fillRef idx="1">
+            <a:schemeClr val="accent1"/>
+          </a:fillRef>
+          <a:effectRef idx="0">
+            <a:schemeClr val="accent1"/>
+          </a:effectRef>
+          <a:fontRef idx="minor">
+            <a:schemeClr val="lt1"/>
+          </a:fontRef>
+        </p:style>
+        <p:txBody>
+          <a:bodyPr rtlCol="0" anchor="ctr"/>
+          <a:lstStyle/>
+          <a:p>
+            <a:pPr algn="ctr"/>
+            <a:endParaRPr lang="pt-BR" dirty="0"/>
+          </a:p>
+        </p:txBody>
+      </p:sp>
+      <p:sp>
+        <p:nvSpPr>
+          <p:cNvPr id="9" name="Oval 8">
+            <a:extLst>
+              <a:ext uri="{FF2B5EF4-FFF2-40B4-BE49-F238E27FC236}">
+                <a16:creationId xmlns:a16="http://schemas.microsoft.com/office/drawing/2014/main" id="{45FC7F3F-EF59-1F4C-95CD-260D42B079BE}"/>
+              </a:ext>
+            </a:extLst>
+          </p:cNvPr>
+          <p:cNvSpPr/>
+          <p:nvPr/>
+        </p:nvSpPr>
+        <p:spPr>
+          <a:xfrm>
+            <a:off x="5066209" y="1180738"/>
+            <a:ext cx="72000" cy="72000"/>
+          </a:xfrm>
+          <a:prstGeom prst="ellipse">
+            <a:avLst/>
+          </a:prstGeom>
+          <a:solidFill>
+            <a:schemeClr val="tx1"/>
+          </a:solidFill>
+          <a:ln>
+            <a:solidFill>
+              <a:schemeClr val="tx1"/>
+            </a:solidFill>
+          </a:ln>
+        </p:spPr>
+        <p:style>
+          <a:lnRef idx="2">
+            <a:schemeClr val="accent1">
+              <a:shade val="50000"/>
+            </a:schemeClr>
+          </a:lnRef>
+          <a:fillRef idx="1">
+            <a:schemeClr val="accent1"/>
+          </a:fillRef>
+          <a:effectRef idx="0">
+            <a:schemeClr val="accent1"/>
+          </a:effectRef>
+          <a:fontRef idx="minor">
+            <a:schemeClr val="lt1"/>
+          </a:fontRef>
+        </p:style>
+        <p:txBody>
+          <a:bodyPr rtlCol="0" anchor="ctr"/>
+          <a:lstStyle/>
+          <a:p>
+            <a:pPr algn="ctr"/>
+            <a:endParaRPr lang="pt-BR" dirty="0"/>
+          </a:p>
+        </p:txBody>
+      </p:sp>
+      <p:sp>
+        <p:nvSpPr>
+          <p:cNvPr id="10" name="Oval 9">
+            <a:extLst>
+              <a:ext uri="{FF2B5EF4-FFF2-40B4-BE49-F238E27FC236}">
+                <a16:creationId xmlns:a16="http://schemas.microsoft.com/office/drawing/2014/main" id="{D5050182-889E-0A4D-889B-4C34E5DC25A5}"/>
+              </a:ext>
+            </a:extLst>
+          </p:cNvPr>
+          <p:cNvSpPr/>
+          <p:nvPr/>
+        </p:nvSpPr>
+        <p:spPr>
+          <a:xfrm>
+            <a:off x="6576903" y="1176031"/>
+            <a:ext cx="72000" cy="72000"/>
+          </a:xfrm>
+          <a:prstGeom prst="ellipse">
+            <a:avLst/>
+          </a:prstGeom>
+          <a:solidFill>
+            <a:schemeClr val="tx1"/>
+          </a:solidFill>
+          <a:ln>
+            <a:solidFill>
+              <a:schemeClr val="tx1"/>
+            </a:solidFill>
+          </a:ln>
+        </p:spPr>
+        <p:style>
+          <a:lnRef idx="2">
+            <a:schemeClr val="accent1">
+              <a:shade val="50000"/>
+            </a:schemeClr>
+          </a:lnRef>
+          <a:fillRef idx="1">
+            <a:schemeClr val="accent1"/>
+          </a:fillRef>
+          <a:effectRef idx="0">
+            <a:schemeClr val="accent1"/>
+          </a:effectRef>
+          <a:fontRef idx="minor">
+            <a:schemeClr val="lt1"/>
+          </a:fontRef>
+        </p:style>
+        <p:txBody>
+          <a:bodyPr rtlCol="0" anchor="ctr"/>
+          <a:lstStyle/>
+          <a:p>
+            <a:pPr algn="ctr"/>
+            <a:endParaRPr lang="pt-BR" dirty="0"/>
+          </a:p>
+        </p:txBody>
+      </p:sp>
+      <p:pic>
+        <p:nvPicPr>
+          <p:cNvPr id="11" name="Gráfico 10" descr="Banco">
+            <a:extLst>
+              <a:ext uri="{FF2B5EF4-FFF2-40B4-BE49-F238E27FC236}">
+                <a16:creationId xmlns:a16="http://schemas.microsoft.com/office/drawing/2014/main" id="{D94AC31F-A6A0-8144-8B7D-57D776F1F4D7}"/>
+              </a:ext>
+            </a:extLst>
+          </p:cNvPr>
+          <p:cNvPicPr>
+            <a:picLocks noChangeAspect="1"/>
+          </p:cNvPicPr>
+          <p:nvPr/>
+        </p:nvPicPr>
+        <p:blipFill>
+          <a:blip r:embed="rId5">
+            <a:extLst>
+              <a:ext uri="{96DAC541-7B7A-43D3-8B79-37D633B846F1}">
+                <asvg:svgBlip xmlns:asvg="http://schemas.microsoft.com/office/drawing/2016/SVG/main" r:embed="rId6"/>
+              </a:ext>
+            </a:extLst>
+          </a:blip>
+          <a:stretch>
+            <a:fillRect/>
+          </a:stretch>
+        </p:blipFill>
+        <p:spPr>
+          <a:xfrm>
+            <a:off x="4867710" y="1183686"/>
+            <a:ext cx="468000" cy="468000"/>
+          </a:xfrm>
+          <a:prstGeom prst="rect">
+            <a:avLst/>
+          </a:prstGeom>
+        </p:spPr>
+      </p:pic>
+      <p:pic>
+        <p:nvPicPr>
+          <p:cNvPr id="12" name="Gráfico 11" descr="Banco">
+            <a:extLst>
+              <a:ext uri="{FF2B5EF4-FFF2-40B4-BE49-F238E27FC236}">
+                <a16:creationId xmlns:a16="http://schemas.microsoft.com/office/drawing/2014/main" id="{935A63D5-40F1-544F-84DF-AFC16C3531E4}"/>
+              </a:ext>
+            </a:extLst>
+          </p:cNvPr>
+          <p:cNvPicPr>
+            <a:picLocks noChangeAspect="1"/>
+          </p:cNvPicPr>
+          <p:nvPr/>
+        </p:nvPicPr>
+        <p:blipFill>
+          <a:blip r:embed="rId5">
+            <a:extLst>
+              <a:ext uri="{96DAC541-7B7A-43D3-8B79-37D633B846F1}">
+                <asvg:svgBlip xmlns:asvg="http://schemas.microsoft.com/office/drawing/2016/SVG/main" r:embed="rId6"/>
+              </a:ext>
+            </a:extLst>
+          </a:blip>
+          <a:stretch>
+            <a:fillRect/>
+          </a:stretch>
+        </p:blipFill>
+        <p:spPr>
+          <a:xfrm>
+            <a:off x="6378903" y="1176031"/>
+            <a:ext cx="468000" cy="468000"/>
+          </a:xfrm>
+          <a:prstGeom prst="rect">
+            <a:avLst/>
+          </a:prstGeom>
+        </p:spPr>
+      </p:pic>
+      <p:cxnSp>
+        <p:nvCxnSpPr>
+          <p:cNvPr id="14" name="Conector Reto 13">
+            <a:extLst>
+              <a:ext uri="{FF2B5EF4-FFF2-40B4-BE49-F238E27FC236}">
+                <a16:creationId xmlns:a16="http://schemas.microsoft.com/office/drawing/2014/main" id="{0F2231F7-2895-7242-9F3A-408AD2BAD302}"/>
+              </a:ext>
+            </a:extLst>
+          </p:cNvPr>
+          <p:cNvCxnSpPr>
+            <a:stCxn id="5" idx="2"/>
+            <a:endCxn id="8" idx="0"/>
+          </p:cNvCxnSpPr>
+          <p:nvPr/>
+        </p:nvCxnSpPr>
+        <p:spPr>
+          <a:xfrm flipH="1">
+            <a:off x="3671763" y="772378"/>
+            <a:ext cx="2423459" cy="475654"/>
+          </a:xfrm>
+          <a:prstGeom prst="line">
+            <a:avLst/>
+          </a:prstGeom>
+        </p:spPr>
+        <p:style>
+          <a:lnRef idx="1">
+            <a:schemeClr val="dk1"/>
+          </a:lnRef>
+          <a:fillRef idx="0">
+            <a:schemeClr val="dk1"/>
+          </a:fillRef>
+          <a:effectRef idx="0">
+            <a:schemeClr val="dk1"/>
+          </a:effectRef>
+          <a:fontRef idx="minor">
+            <a:schemeClr val="tx1"/>
+          </a:fontRef>
+        </p:style>
+      </p:cxnSp>
+      <p:cxnSp>
+        <p:nvCxnSpPr>
+          <p:cNvPr id="16" name="Conector Reto 15">
+            <a:extLst>
+              <a:ext uri="{FF2B5EF4-FFF2-40B4-BE49-F238E27FC236}">
+                <a16:creationId xmlns:a16="http://schemas.microsoft.com/office/drawing/2014/main" id="{5F72473E-DEF4-4146-977B-E562463B95EC}"/>
+              </a:ext>
+            </a:extLst>
+          </p:cNvPr>
+          <p:cNvCxnSpPr>
+            <a:stCxn id="5" idx="2"/>
+            <a:endCxn id="11" idx="0"/>
+          </p:cNvCxnSpPr>
+          <p:nvPr/>
+        </p:nvCxnSpPr>
+        <p:spPr>
+          <a:xfrm flipH="1">
+            <a:off x="5101710" y="772378"/>
+            <a:ext cx="993512" cy="411308"/>
+          </a:xfrm>
+          <a:prstGeom prst="line">
+            <a:avLst/>
+          </a:prstGeom>
+        </p:spPr>
+        <p:style>
+          <a:lnRef idx="1">
+            <a:schemeClr val="dk1"/>
+          </a:lnRef>
+          <a:fillRef idx="0">
+            <a:schemeClr val="dk1"/>
+          </a:fillRef>
+          <a:effectRef idx="0">
+            <a:schemeClr val="dk1"/>
+          </a:effectRef>
+          <a:fontRef idx="minor">
+            <a:schemeClr val="tx1"/>
+          </a:fontRef>
+        </p:style>
+      </p:cxnSp>
+      <p:cxnSp>
+        <p:nvCxnSpPr>
+          <p:cNvPr id="18" name="Conector Reto 17">
+            <a:extLst>
+              <a:ext uri="{FF2B5EF4-FFF2-40B4-BE49-F238E27FC236}">
+                <a16:creationId xmlns:a16="http://schemas.microsoft.com/office/drawing/2014/main" id="{9FE6A757-066B-F243-B4F8-147B783598DC}"/>
+              </a:ext>
+            </a:extLst>
+          </p:cNvPr>
+          <p:cNvCxnSpPr>
+            <a:stCxn id="5" idx="2"/>
+            <a:endCxn id="12" idx="0"/>
+          </p:cNvCxnSpPr>
+          <p:nvPr/>
+        </p:nvCxnSpPr>
+        <p:spPr>
+          <a:xfrm>
+            <a:off x="6095222" y="772378"/>
+            <a:ext cx="517681" cy="403653"/>
+          </a:xfrm>
+          <a:prstGeom prst="line">
+            <a:avLst/>
+          </a:prstGeom>
+        </p:spPr>
+        <p:style>
+          <a:lnRef idx="1">
+            <a:schemeClr val="dk1"/>
+          </a:lnRef>
+          <a:fillRef idx="0">
+            <a:schemeClr val="dk1"/>
+          </a:fillRef>
+          <a:effectRef idx="0">
+            <a:schemeClr val="dk1"/>
+          </a:effectRef>
+          <a:fontRef idx="minor">
+            <a:schemeClr val="tx1"/>
+          </a:fontRef>
+        </p:style>
+      </p:cxnSp>
+      <p:sp>
+        <p:nvSpPr>
+          <p:cNvPr id="19" name="CaixaDeTexto 18">
+            <a:extLst>
+              <a:ext uri="{FF2B5EF4-FFF2-40B4-BE49-F238E27FC236}">
+                <a16:creationId xmlns:a16="http://schemas.microsoft.com/office/drawing/2014/main" id="{B3D734B3-91E8-A54E-B0BF-6A5F47460754}"/>
+              </a:ext>
+            </a:extLst>
+          </p:cNvPr>
+          <p:cNvSpPr txBox="1"/>
+          <p:nvPr/>
+        </p:nvSpPr>
+        <p:spPr>
+          <a:xfrm>
+            <a:off x="5213761" y="889566"/>
+            <a:ext cx="570151" cy="169277"/>
+          </a:xfrm>
+          <a:prstGeom prst="rect">
+            <a:avLst/>
+          </a:prstGeom>
+          <a:solidFill>
+            <a:schemeClr val="bg1">
+              <a:lumMod val="85000"/>
+            </a:schemeClr>
+          </a:solidFill>
+        </p:spPr>
+        <p:txBody>
+          <a:bodyPr wrap="square" rtlCol="0">
+            <a:spAutoFit/>
+          </a:bodyPr>
+          <a:lstStyle/>
+          <a:p>
+            <a:pPr algn="ctr"/>
+            <a:r>
+              <a:rPr lang="pt-BR" sz="500" dirty="0"/>
+              <a:t>À Vista</a:t>
+            </a:r>
+          </a:p>
+        </p:txBody>
+      </p:sp>
+      <p:sp>
+        <p:nvSpPr>
+          <p:cNvPr id="20" name="CaixaDeTexto 19">
+            <a:extLst>
+              <a:ext uri="{FF2B5EF4-FFF2-40B4-BE49-F238E27FC236}">
+                <a16:creationId xmlns:a16="http://schemas.microsoft.com/office/drawing/2014/main" id="{9EFC08F9-2CA2-9B4D-AF12-A71DE75D951A}"/>
+              </a:ext>
+            </a:extLst>
+          </p:cNvPr>
+          <p:cNvSpPr txBox="1"/>
+          <p:nvPr/>
+        </p:nvSpPr>
+        <p:spPr>
+          <a:xfrm>
+            <a:off x="6032487" y="892606"/>
+            <a:ext cx="765215" cy="169277"/>
+          </a:xfrm>
+          <a:prstGeom prst="rect">
+            <a:avLst/>
+          </a:prstGeom>
+          <a:solidFill>
+            <a:schemeClr val="bg1">
+              <a:lumMod val="85000"/>
+            </a:schemeClr>
+          </a:solidFill>
+        </p:spPr>
+        <p:txBody>
+          <a:bodyPr wrap="square" rtlCol="0">
+            <a:spAutoFit/>
+          </a:bodyPr>
+          <a:lstStyle/>
+          <a:p>
+            <a:pPr algn="ctr"/>
+            <a:r>
+              <a:rPr lang="pt-BR" sz="500" dirty="0"/>
+              <a:t>Financiamento Padrão</a:t>
+            </a:r>
+          </a:p>
+        </p:txBody>
+      </p:sp>
+      <p:sp>
+        <p:nvSpPr>
+          <p:cNvPr id="21" name="CaixaDeTexto 20">
+            <a:extLst>
+              <a:ext uri="{FF2B5EF4-FFF2-40B4-BE49-F238E27FC236}">
+                <a16:creationId xmlns:a16="http://schemas.microsoft.com/office/drawing/2014/main" id="{EE4D2C7F-2F51-5448-B244-FBCDC411F914}"/>
+              </a:ext>
+            </a:extLst>
+          </p:cNvPr>
+          <p:cNvSpPr txBox="1"/>
+          <p:nvPr/>
+        </p:nvSpPr>
+        <p:spPr>
+          <a:xfrm>
+            <a:off x="4296081" y="889566"/>
+            <a:ext cx="514813" cy="169277"/>
+          </a:xfrm>
+          <a:prstGeom prst="rect">
+            <a:avLst/>
+          </a:prstGeom>
+          <a:solidFill>
+            <a:schemeClr val="bg1">
+              <a:lumMod val="85000"/>
+            </a:schemeClr>
+          </a:solidFill>
+        </p:spPr>
+        <p:txBody>
+          <a:bodyPr wrap="square" rtlCol="0">
+            <a:spAutoFit/>
+          </a:bodyPr>
+          <a:lstStyle/>
+          <a:p>
+            <a:pPr algn="ctr"/>
+            <a:r>
+              <a:rPr lang="pt-BR" sz="500" dirty="0"/>
+              <a:t>Não Compra</a:t>
+            </a:r>
+          </a:p>
+        </p:txBody>
+      </p:sp>
+      <p:sp>
+        <p:nvSpPr>
+          <p:cNvPr id="22" name="CaixaDeTexto 21">
+            <a:extLst>
+              <a:ext uri="{FF2B5EF4-FFF2-40B4-BE49-F238E27FC236}">
+                <a16:creationId xmlns:a16="http://schemas.microsoft.com/office/drawing/2014/main" id="{ADA85241-56AD-6B46-87E0-09498B0B13E4}"/>
+              </a:ext>
+            </a:extLst>
+          </p:cNvPr>
+          <p:cNvSpPr txBox="1"/>
+          <p:nvPr/>
+        </p:nvSpPr>
+        <p:spPr>
+          <a:xfrm>
+            <a:off x="5808752" y="124992"/>
+            <a:ext cx="570151" cy="169277"/>
+          </a:xfrm>
+          <a:prstGeom prst="rect">
+            <a:avLst/>
+          </a:prstGeom>
+          <a:noFill/>
+          <a:ln>
+            <a:noFill/>
+          </a:ln>
+        </p:spPr>
+        <p:txBody>
+          <a:bodyPr wrap="square" rtlCol="0">
+            <a:spAutoFit/>
+          </a:bodyPr>
+          <a:lstStyle/>
+          <a:p>
+            <a:pPr algn="ctr"/>
+            <a:r>
+              <a:rPr lang="pt-BR" sz="500" b="1" dirty="0"/>
+              <a:t>COMPRADOR</a:t>
+            </a:r>
+          </a:p>
+        </p:txBody>
+      </p:sp>
+      <p:sp>
+        <p:nvSpPr>
+          <p:cNvPr id="23" name="CaixaDeTexto 22">
+            <a:extLst>
+              <a:ext uri="{FF2B5EF4-FFF2-40B4-BE49-F238E27FC236}">
+                <a16:creationId xmlns:a16="http://schemas.microsoft.com/office/drawing/2014/main" id="{8DD8A38A-69D9-E24E-A5E2-2E5E33E1CF8F}"/>
+              </a:ext>
+            </a:extLst>
+          </p:cNvPr>
+          <p:cNvSpPr txBox="1"/>
+          <p:nvPr/>
+        </p:nvSpPr>
+        <p:spPr>
+          <a:xfrm>
+            <a:off x="3386687" y="1651686"/>
+            <a:ext cx="570151" cy="246221"/>
+          </a:xfrm>
+          <a:prstGeom prst="rect">
+            <a:avLst/>
+          </a:prstGeom>
+          <a:noFill/>
+          <a:ln>
+            <a:noFill/>
+          </a:ln>
+        </p:spPr>
+        <p:txBody>
+          <a:bodyPr wrap="square" rtlCol="0">
+            <a:spAutoFit/>
+          </a:bodyPr>
+          <a:lstStyle/>
+          <a:p>
+            <a:pPr algn="ctr"/>
+            <a:r>
+              <a:rPr lang="pt-BR" sz="500" b="1" dirty="0"/>
+              <a:t>AGENTE FINANCEIRO</a:t>
+            </a:r>
+          </a:p>
+        </p:txBody>
+      </p:sp>
+      <p:sp>
+        <p:nvSpPr>
+          <p:cNvPr id="24" name="CaixaDeTexto 23">
+            <a:extLst>
+              <a:ext uri="{FF2B5EF4-FFF2-40B4-BE49-F238E27FC236}">
+                <a16:creationId xmlns:a16="http://schemas.microsoft.com/office/drawing/2014/main" id="{B3D94B2A-348E-9F48-AD99-3136221F949B}"/>
+              </a:ext>
+            </a:extLst>
+          </p:cNvPr>
+          <p:cNvSpPr txBox="1"/>
+          <p:nvPr/>
+        </p:nvSpPr>
+        <p:spPr>
+          <a:xfrm>
+            <a:off x="4814461" y="1584392"/>
+            <a:ext cx="570151" cy="246221"/>
+          </a:xfrm>
+          <a:prstGeom prst="rect">
+            <a:avLst/>
+          </a:prstGeom>
+          <a:noFill/>
+          <a:ln>
+            <a:noFill/>
+          </a:ln>
+        </p:spPr>
+        <p:txBody>
+          <a:bodyPr wrap="square" rtlCol="0">
+            <a:spAutoFit/>
+          </a:bodyPr>
+          <a:lstStyle/>
+          <a:p>
+            <a:pPr algn="ctr"/>
+            <a:r>
+              <a:rPr lang="pt-BR" sz="500" b="1" dirty="0"/>
+              <a:t>AGENTE FINANCEIRO</a:t>
+            </a:r>
+          </a:p>
+        </p:txBody>
+      </p:sp>
+      <p:sp>
+        <p:nvSpPr>
+          <p:cNvPr id="25" name="CaixaDeTexto 24">
+            <a:extLst>
+              <a:ext uri="{FF2B5EF4-FFF2-40B4-BE49-F238E27FC236}">
+                <a16:creationId xmlns:a16="http://schemas.microsoft.com/office/drawing/2014/main" id="{C3A2E568-7FB1-7E4F-841A-AC2BDE6081A3}"/>
+              </a:ext>
+            </a:extLst>
+          </p:cNvPr>
+          <p:cNvSpPr txBox="1"/>
+          <p:nvPr/>
+        </p:nvSpPr>
+        <p:spPr>
+          <a:xfrm>
+            <a:off x="6321734" y="1579684"/>
+            <a:ext cx="570151" cy="246221"/>
+          </a:xfrm>
+          <a:prstGeom prst="rect">
+            <a:avLst/>
+          </a:prstGeom>
+          <a:noFill/>
+          <a:ln>
+            <a:noFill/>
+          </a:ln>
+        </p:spPr>
+        <p:txBody>
+          <a:bodyPr wrap="square" rtlCol="0">
+            <a:spAutoFit/>
+          </a:bodyPr>
+          <a:lstStyle/>
+          <a:p>
+            <a:pPr algn="ctr"/>
+            <a:r>
+              <a:rPr lang="pt-BR" sz="500" b="1" dirty="0"/>
+              <a:t>AGENTE FINANCEIRO</a:t>
+            </a:r>
+          </a:p>
+        </p:txBody>
+      </p:sp>
+      <p:sp>
+        <p:nvSpPr>
+          <p:cNvPr id="26" name="CaixaDeTexto 25">
+            <a:extLst>
+              <a:ext uri="{FF2B5EF4-FFF2-40B4-BE49-F238E27FC236}">
+                <a16:creationId xmlns:a16="http://schemas.microsoft.com/office/drawing/2014/main" id="{EBB84142-8A63-2547-B222-79FCB590D2C7}"/>
+              </a:ext>
+            </a:extLst>
+          </p:cNvPr>
+          <p:cNvSpPr txBox="1"/>
+          <p:nvPr/>
+        </p:nvSpPr>
+        <p:spPr>
+          <a:xfrm>
+            <a:off x="3354693" y="1832638"/>
+            <a:ext cx="570151" cy="246221"/>
+          </a:xfrm>
+          <a:prstGeom prst="rect">
+            <a:avLst/>
+          </a:prstGeom>
+          <a:noFill/>
+          <a:ln>
+            <a:noFill/>
+          </a:ln>
+        </p:spPr>
+        <p:txBody>
+          <a:bodyPr wrap="square" rtlCol="0">
+            <a:spAutoFit/>
+          </a:bodyPr>
+          <a:lstStyle/>
+          <a:p>
+            <a:pPr algn="ctr"/>
+            <a:r>
+              <a:rPr lang="pt-BR" sz="1000" b="1" dirty="0"/>
+              <a:t>(0, 0)</a:t>
+            </a:r>
+          </a:p>
+        </p:txBody>
+      </p:sp>
+      <p:cxnSp>
+        <p:nvCxnSpPr>
+          <p:cNvPr id="27" name="Conector Reto 26">
+            <a:extLst>
+              <a:ext uri="{FF2B5EF4-FFF2-40B4-BE49-F238E27FC236}">
+                <a16:creationId xmlns:a16="http://schemas.microsoft.com/office/drawing/2014/main" id="{F2CE2E40-0507-044C-9AB3-67A6D6A88607}"/>
+              </a:ext>
+            </a:extLst>
+          </p:cNvPr>
+          <p:cNvCxnSpPr>
+            <a:stCxn id="24" idx="2"/>
+          </p:cNvCxnSpPr>
+          <p:nvPr/>
+        </p:nvCxnSpPr>
+        <p:spPr>
+          <a:xfrm flipH="1">
+            <a:off x="4814461" y="1830613"/>
+            <a:ext cx="285076" cy="400706"/>
+          </a:xfrm>
+          <a:prstGeom prst="line">
+            <a:avLst/>
+          </a:prstGeom>
+        </p:spPr>
+        <p:style>
+          <a:lnRef idx="1">
+            <a:schemeClr val="dk1"/>
+          </a:lnRef>
+          <a:fillRef idx="0">
+            <a:schemeClr val="dk1"/>
+          </a:fillRef>
+          <a:effectRef idx="0">
+            <a:schemeClr val="dk1"/>
+          </a:effectRef>
+          <a:fontRef idx="minor">
+            <a:schemeClr val="tx1"/>
+          </a:fontRef>
+        </p:style>
+      </p:cxnSp>
+      <p:cxnSp>
+        <p:nvCxnSpPr>
+          <p:cNvPr id="30" name="Conector Reto 29">
+            <a:extLst>
+              <a:ext uri="{FF2B5EF4-FFF2-40B4-BE49-F238E27FC236}">
+                <a16:creationId xmlns:a16="http://schemas.microsoft.com/office/drawing/2014/main" id="{52EEC96F-FA39-4D49-9608-5FB3B81ABE30}"/>
+              </a:ext>
+            </a:extLst>
+          </p:cNvPr>
+          <p:cNvCxnSpPr>
+            <a:stCxn id="24" idx="2"/>
+          </p:cNvCxnSpPr>
+          <p:nvPr/>
+        </p:nvCxnSpPr>
+        <p:spPr>
+          <a:xfrm>
+            <a:off x="5099537" y="1830613"/>
+            <a:ext cx="285075" cy="400706"/>
+          </a:xfrm>
+          <a:prstGeom prst="line">
+            <a:avLst/>
+          </a:prstGeom>
+        </p:spPr>
+        <p:style>
+          <a:lnRef idx="1">
+            <a:schemeClr val="dk1"/>
+          </a:lnRef>
+          <a:fillRef idx="0">
+            <a:schemeClr val="dk1"/>
+          </a:fillRef>
+          <a:effectRef idx="0">
+            <a:schemeClr val="dk1"/>
+          </a:effectRef>
+          <a:fontRef idx="minor">
+            <a:schemeClr val="tx1"/>
+          </a:fontRef>
+        </p:style>
+      </p:cxnSp>
+      <p:sp>
+        <p:nvSpPr>
+          <p:cNvPr id="34" name="CaixaDeTexto 33">
+            <a:extLst>
+              <a:ext uri="{FF2B5EF4-FFF2-40B4-BE49-F238E27FC236}">
+                <a16:creationId xmlns:a16="http://schemas.microsoft.com/office/drawing/2014/main" id="{5580F55C-1593-0046-8998-7CEF1C4657CE}"/>
+              </a:ext>
+            </a:extLst>
+          </p:cNvPr>
+          <p:cNvSpPr txBox="1"/>
+          <p:nvPr/>
+        </p:nvSpPr>
+        <p:spPr>
+          <a:xfrm>
+            <a:off x="4581175" y="1967753"/>
+            <a:ext cx="375824" cy="169277"/>
+          </a:xfrm>
+          <a:prstGeom prst="rect">
+            <a:avLst/>
+          </a:prstGeom>
+          <a:solidFill>
+            <a:schemeClr val="bg1">
+              <a:lumMod val="85000"/>
+            </a:schemeClr>
+          </a:solidFill>
+        </p:spPr>
+        <p:txBody>
+          <a:bodyPr wrap="square" rtlCol="0">
+            <a:spAutoFit/>
+          </a:bodyPr>
+          <a:lstStyle/>
+          <a:p>
+            <a:pPr algn="ctr"/>
+            <a:r>
+              <a:rPr lang="pt-BR" sz="500" dirty="0"/>
+              <a:t>Aceita</a:t>
+            </a:r>
+          </a:p>
+        </p:txBody>
+      </p:sp>
+      <p:sp>
+        <p:nvSpPr>
+          <p:cNvPr id="35" name="CaixaDeTexto 34">
+            <a:extLst>
+              <a:ext uri="{FF2B5EF4-FFF2-40B4-BE49-F238E27FC236}">
+                <a16:creationId xmlns:a16="http://schemas.microsoft.com/office/drawing/2014/main" id="{E4655279-C67D-1145-8321-87FEAA36043C}"/>
+              </a:ext>
+            </a:extLst>
+          </p:cNvPr>
+          <p:cNvSpPr txBox="1"/>
+          <p:nvPr/>
+        </p:nvSpPr>
+        <p:spPr>
+          <a:xfrm>
+            <a:off x="5249864" y="1967636"/>
+            <a:ext cx="375824" cy="169277"/>
+          </a:xfrm>
+          <a:prstGeom prst="rect">
+            <a:avLst/>
+          </a:prstGeom>
+          <a:solidFill>
+            <a:schemeClr val="accent2">
+              <a:lumMod val="60000"/>
+              <a:lumOff val="40000"/>
+            </a:schemeClr>
+          </a:solidFill>
+        </p:spPr>
+        <p:txBody>
+          <a:bodyPr wrap="square" rtlCol="0">
+            <a:spAutoFit/>
+          </a:bodyPr>
+          <a:lstStyle/>
+          <a:p>
+            <a:pPr algn="ctr"/>
+            <a:r>
+              <a:rPr lang="pt-BR" sz="500" dirty="0"/>
+              <a:t>Rejeita</a:t>
+            </a:r>
+          </a:p>
+        </p:txBody>
+      </p:sp>
+      <p:sp>
+        <p:nvSpPr>
+          <p:cNvPr id="36" name="CaixaDeTexto 35">
+            <a:extLst>
+              <a:ext uri="{FF2B5EF4-FFF2-40B4-BE49-F238E27FC236}">
+                <a16:creationId xmlns:a16="http://schemas.microsoft.com/office/drawing/2014/main" id="{3DB3215F-5FDC-CF49-99D7-4C0D82344970}"/>
+              </a:ext>
+            </a:extLst>
+          </p:cNvPr>
+          <p:cNvSpPr txBox="1"/>
+          <p:nvPr/>
+        </p:nvSpPr>
+        <p:spPr>
+          <a:xfrm>
+            <a:off x="5077740" y="2202202"/>
+            <a:ext cx="702066" cy="246221"/>
+          </a:xfrm>
+          <a:prstGeom prst="rect">
+            <a:avLst/>
+          </a:prstGeom>
+          <a:noFill/>
+          <a:ln>
+            <a:noFill/>
+          </a:ln>
+        </p:spPr>
+        <p:txBody>
+          <a:bodyPr wrap="square" rtlCol="0">
+            <a:spAutoFit/>
+          </a:bodyPr>
+          <a:lstStyle/>
+          <a:p>
+            <a:pPr algn="ctr"/>
+            <a:r>
+              <a:rPr lang="pt-BR" sz="1000" b="1" dirty="0"/>
+              <a:t>(V-P, P)</a:t>
+            </a:r>
+          </a:p>
+        </p:txBody>
+      </p:sp>
+      <p:sp>
+        <p:nvSpPr>
+          <p:cNvPr id="37" name="CaixaDeTexto 36">
+            <a:extLst>
+              <a:ext uri="{FF2B5EF4-FFF2-40B4-BE49-F238E27FC236}">
+                <a16:creationId xmlns:a16="http://schemas.microsoft.com/office/drawing/2014/main" id="{EF4B825C-7B81-0E43-9B9A-2867F26C2468}"/>
+              </a:ext>
+            </a:extLst>
+          </p:cNvPr>
+          <p:cNvSpPr txBox="1"/>
+          <p:nvPr/>
+        </p:nvSpPr>
+        <p:spPr>
+          <a:xfrm>
+            <a:off x="4511264" y="2189624"/>
+            <a:ext cx="570151" cy="246221"/>
+          </a:xfrm>
+          <a:prstGeom prst="rect">
+            <a:avLst/>
+          </a:prstGeom>
+          <a:noFill/>
+          <a:ln>
+            <a:noFill/>
+          </a:ln>
+        </p:spPr>
+        <p:txBody>
+          <a:bodyPr wrap="square" rtlCol="0">
+            <a:spAutoFit/>
+          </a:bodyPr>
+          <a:lstStyle/>
+          <a:p>
+            <a:pPr algn="ctr"/>
+            <a:r>
+              <a:rPr lang="pt-BR" sz="1000" b="1" dirty="0"/>
+              <a:t>(0, 0)</a:t>
+            </a:r>
+          </a:p>
+        </p:txBody>
+      </p:sp>
+      <p:cxnSp>
+        <p:nvCxnSpPr>
+          <p:cNvPr id="38" name="Conector Reto 37">
+            <a:extLst>
+              <a:ext uri="{FF2B5EF4-FFF2-40B4-BE49-F238E27FC236}">
+                <a16:creationId xmlns:a16="http://schemas.microsoft.com/office/drawing/2014/main" id="{A2CD662C-6AC1-264C-8653-9191335075F0}"/>
+              </a:ext>
+            </a:extLst>
+          </p:cNvPr>
+          <p:cNvCxnSpPr>
+            <a:stCxn id="25" idx="2"/>
+            <a:endCxn id="48" idx="0"/>
+          </p:cNvCxnSpPr>
+          <p:nvPr/>
+        </p:nvCxnSpPr>
+        <p:spPr>
+          <a:xfrm flipH="1">
+            <a:off x="6357977" y="1825905"/>
+            <a:ext cx="248833" cy="400707"/>
+          </a:xfrm>
+          <a:prstGeom prst="line">
+            <a:avLst/>
+          </a:prstGeom>
+        </p:spPr>
+        <p:style>
+          <a:lnRef idx="1">
+            <a:schemeClr val="dk1"/>
+          </a:lnRef>
+          <a:fillRef idx="0">
+            <a:schemeClr val="dk1"/>
+          </a:fillRef>
+          <a:effectRef idx="0">
+            <a:schemeClr val="dk1"/>
+          </a:effectRef>
+          <a:fontRef idx="minor">
+            <a:schemeClr val="tx1"/>
+          </a:fontRef>
+        </p:style>
+      </p:cxnSp>
+      <p:cxnSp>
+        <p:nvCxnSpPr>
+          <p:cNvPr id="39" name="Conector Reto 38">
+            <a:extLst>
+              <a:ext uri="{FF2B5EF4-FFF2-40B4-BE49-F238E27FC236}">
+                <a16:creationId xmlns:a16="http://schemas.microsoft.com/office/drawing/2014/main" id="{E4E8A8AD-5857-A045-85AD-E1413F7701DD}"/>
+              </a:ext>
+            </a:extLst>
+          </p:cNvPr>
+          <p:cNvCxnSpPr/>
+          <p:nvPr/>
+        </p:nvCxnSpPr>
+        <p:spPr>
+          <a:xfrm>
+            <a:off x="6613044" y="1825906"/>
+            <a:ext cx="285075" cy="400706"/>
+          </a:xfrm>
+          <a:prstGeom prst="line">
+            <a:avLst/>
+          </a:prstGeom>
+        </p:spPr>
+        <p:style>
+          <a:lnRef idx="1">
+            <a:schemeClr val="dk1"/>
+          </a:lnRef>
+          <a:fillRef idx="0">
+            <a:schemeClr val="dk1"/>
+          </a:fillRef>
+          <a:effectRef idx="0">
+            <a:schemeClr val="dk1"/>
+          </a:effectRef>
+          <a:fontRef idx="minor">
+            <a:schemeClr val="tx1"/>
+          </a:fontRef>
+        </p:style>
+      </p:cxnSp>
+      <p:sp>
+        <p:nvSpPr>
+          <p:cNvPr id="40" name="CaixaDeTexto 39">
+            <a:extLst>
+              <a:ext uri="{FF2B5EF4-FFF2-40B4-BE49-F238E27FC236}">
+                <a16:creationId xmlns:a16="http://schemas.microsoft.com/office/drawing/2014/main" id="{87800389-B6A9-1742-B3A2-8D2D5FEF6AE1}"/>
+              </a:ext>
+            </a:extLst>
+          </p:cNvPr>
+          <p:cNvSpPr txBox="1"/>
+          <p:nvPr/>
+        </p:nvSpPr>
+        <p:spPr>
+          <a:xfrm>
+            <a:off x="6094682" y="1963046"/>
+            <a:ext cx="375824" cy="169277"/>
+          </a:xfrm>
+          <a:prstGeom prst="rect">
+            <a:avLst/>
+          </a:prstGeom>
+          <a:solidFill>
+            <a:schemeClr val="bg1">
+              <a:lumMod val="85000"/>
+            </a:schemeClr>
+          </a:solidFill>
+        </p:spPr>
+        <p:txBody>
+          <a:bodyPr wrap="square" rtlCol="0">
+            <a:spAutoFit/>
+          </a:bodyPr>
+          <a:lstStyle/>
+          <a:p>
+            <a:pPr algn="ctr"/>
+            <a:r>
+              <a:rPr lang="pt-BR" sz="500" dirty="0"/>
+              <a:t>Aceita</a:t>
+            </a:r>
+          </a:p>
+        </p:txBody>
+      </p:sp>
+      <p:sp>
+        <p:nvSpPr>
+          <p:cNvPr id="41" name="CaixaDeTexto 40">
+            <a:extLst>
+              <a:ext uri="{FF2B5EF4-FFF2-40B4-BE49-F238E27FC236}">
+                <a16:creationId xmlns:a16="http://schemas.microsoft.com/office/drawing/2014/main" id="{46F34E6C-0FF9-A547-A46C-5C9CE70FED77}"/>
+              </a:ext>
+            </a:extLst>
+          </p:cNvPr>
+          <p:cNvSpPr txBox="1"/>
+          <p:nvPr/>
+        </p:nvSpPr>
+        <p:spPr>
+          <a:xfrm>
+            <a:off x="6763371" y="1962929"/>
+            <a:ext cx="375824" cy="169277"/>
+          </a:xfrm>
+          <a:prstGeom prst="rect">
+            <a:avLst/>
+          </a:prstGeom>
+          <a:solidFill>
+            <a:schemeClr val="accent2">
+              <a:lumMod val="60000"/>
+              <a:lumOff val="40000"/>
+            </a:schemeClr>
+          </a:solidFill>
+        </p:spPr>
+        <p:txBody>
+          <a:bodyPr wrap="square" rtlCol="0">
+            <a:spAutoFit/>
+          </a:bodyPr>
+          <a:lstStyle/>
+          <a:p>
+            <a:pPr algn="ctr"/>
+            <a:r>
+              <a:rPr lang="pt-BR" sz="500" dirty="0"/>
+              <a:t>Rejeita</a:t>
+            </a:r>
+          </a:p>
+        </p:txBody>
+      </p:sp>
+      <p:sp>
+        <p:nvSpPr>
+          <p:cNvPr id="43" name="CaixaDeTexto 42">
+            <a:extLst>
+              <a:ext uri="{FF2B5EF4-FFF2-40B4-BE49-F238E27FC236}">
+                <a16:creationId xmlns:a16="http://schemas.microsoft.com/office/drawing/2014/main" id="{7045AAA0-A7E7-764A-98D6-99BCE51C6864}"/>
+              </a:ext>
+            </a:extLst>
+          </p:cNvPr>
+          <p:cNvSpPr txBox="1"/>
+          <p:nvPr/>
+        </p:nvSpPr>
+        <p:spPr>
+          <a:xfrm>
+            <a:off x="6613044" y="2194358"/>
+            <a:ext cx="570151" cy="246221"/>
+          </a:xfrm>
+          <a:prstGeom prst="rect">
+            <a:avLst/>
+          </a:prstGeom>
+          <a:noFill/>
+          <a:ln>
+            <a:noFill/>
+          </a:ln>
+        </p:spPr>
+        <p:txBody>
+          <a:bodyPr wrap="square" rtlCol="0">
+            <a:spAutoFit/>
+          </a:bodyPr>
+          <a:lstStyle/>
+          <a:p>
+            <a:pPr algn="ctr"/>
+            <a:r>
+              <a:rPr lang="pt-BR" sz="1000" b="1" dirty="0"/>
+              <a:t>(0, 0)</a:t>
+            </a:r>
+          </a:p>
+        </p:txBody>
+      </p:sp>
+      <p:pic>
+        <p:nvPicPr>
+          <p:cNvPr id="48" name="Gráfico 47" descr="Homem">
+            <a:extLst>
+              <a:ext uri="{FF2B5EF4-FFF2-40B4-BE49-F238E27FC236}">
+                <a16:creationId xmlns:a16="http://schemas.microsoft.com/office/drawing/2014/main" id="{79CBF1F2-44F6-AB4D-988E-59F1F8694E98}"/>
+              </a:ext>
+            </a:extLst>
+          </p:cNvPr>
+          <p:cNvPicPr>
+            <a:picLocks noChangeAspect="1"/>
+          </p:cNvPicPr>
+          <p:nvPr/>
+        </p:nvPicPr>
+        <p:blipFill>
+          <a:blip r:embed="rId3">
+            <a:extLst>
+              <a:ext uri="{96DAC541-7B7A-43D3-8B79-37D633B846F1}">
+                <asvg:svgBlip xmlns:asvg="http://schemas.microsoft.com/office/drawing/2016/SVG/main" r:embed="rId4"/>
+              </a:ext>
+            </a:extLst>
+          </a:blip>
+          <a:stretch>
+            <a:fillRect/>
+          </a:stretch>
+        </p:blipFill>
+        <p:spPr>
+          <a:xfrm>
+            <a:off x="6123198" y="2226612"/>
+            <a:ext cx="469557" cy="469557"/>
+          </a:xfrm>
+          <a:prstGeom prst="rect">
+            <a:avLst/>
+          </a:prstGeom>
+        </p:spPr>
+      </p:pic>
+      <p:cxnSp>
+        <p:nvCxnSpPr>
+          <p:cNvPr id="50" name="Conector Reto 49">
+            <a:extLst>
+              <a:ext uri="{FF2B5EF4-FFF2-40B4-BE49-F238E27FC236}">
+                <a16:creationId xmlns:a16="http://schemas.microsoft.com/office/drawing/2014/main" id="{1E9A827E-8219-FF4A-8BB1-20774F51C8C1}"/>
+              </a:ext>
+            </a:extLst>
+          </p:cNvPr>
+          <p:cNvCxnSpPr/>
+          <p:nvPr/>
+        </p:nvCxnSpPr>
+        <p:spPr>
+          <a:xfrm flipH="1">
+            <a:off x="6042978" y="2794835"/>
+            <a:ext cx="292705" cy="486735"/>
+          </a:xfrm>
+          <a:prstGeom prst="line">
+            <a:avLst/>
+          </a:prstGeom>
+        </p:spPr>
+        <p:style>
+          <a:lnRef idx="1">
+            <a:schemeClr val="dk1"/>
+          </a:lnRef>
+          <a:fillRef idx="0">
+            <a:schemeClr val="dk1"/>
+          </a:fillRef>
+          <a:effectRef idx="0">
+            <a:schemeClr val="dk1"/>
+          </a:effectRef>
+          <a:fontRef idx="minor">
+            <a:schemeClr val="tx1"/>
+          </a:fontRef>
+        </p:style>
+      </p:cxnSp>
+      <p:cxnSp>
+        <p:nvCxnSpPr>
+          <p:cNvPr id="53" name="Conector Reto 52">
+            <a:extLst>
+              <a:ext uri="{FF2B5EF4-FFF2-40B4-BE49-F238E27FC236}">
+                <a16:creationId xmlns:a16="http://schemas.microsoft.com/office/drawing/2014/main" id="{CF83581A-7BA9-C24C-B5A1-356484276FC5}"/>
+              </a:ext>
+            </a:extLst>
+          </p:cNvPr>
+          <p:cNvCxnSpPr/>
+          <p:nvPr/>
+        </p:nvCxnSpPr>
+        <p:spPr>
+          <a:xfrm>
+            <a:off x="6335683" y="2794835"/>
+            <a:ext cx="286469" cy="486735"/>
+          </a:xfrm>
+          <a:prstGeom prst="line">
+            <a:avLst/>
+          </a:prstGeom>
+        </p:spPr>
+        <p:style>
+          <a:lnRef idx="1">
+            <a:schemeClr val="dk1"/>
+          </a:lnRef>
+          <a:fillRef idx="0">
+            <a:schemeClr val="dk1"/>
+          </a:fillRef>
+          <a:effectRef idx="0">
+            <a:schemeClr val="dk1"/>
+          </a:effectRef>
+          <a:fontRef idx="minor">
+            <a:schemeClr val="tx1"/>
+          </a:fontRef>
+        </p:style>
+      </p:cxnSp>
+      <p:sp>
+        <p:nvSpPr>
+          <p:cNvPr id="58" name="CaixaDeTexto 57">
+            <a:extLst>
+              <a:ext uri="{FF2B5EF4-FFF2-40B4-BE49-F238E27FC236}">
+                <a16:creationId xmlns:a16="http://schemas.microsoft.com/office/drawing/2014/main" id="{D16E121C-5CD8-A543-90F6-CB49BFEC7AA2}"/>
+              </a:ext>
+            </a:extLst>
+          </p:cNvPr>
+          <p:cNvSpPr txBox="1"/>
+          <p:nvPr/>
+        </p:nvSpPr>
+        <p:spPr>
+          <a:xfrm>
+            <a:off x="5823976" y="3286293"/>
+            <a:ext cx="409895" cy="169277"/>
+          </a:xfrm>
+          <a:prstGeom prst="rect">
+            <a:avLst/>
+          </a:prstGeom>
+          <a:solidFill>
+            <a:schemeClr val="bg1">
+              <a:lumMod val="85000"/>
+            </a:schemeClr>
+          </a:solidFill>
+        </p:spPr>
+        <p:txBody>
+          <a:bodyPr wrap="square" rtlCol="0">
+            <a:spAutoFit/>
+          </a:bodyPr>
+          <a:lstStyle/>
+          <a:p>
+            <a:pPr algn="ctr"/>
+            <a:r>
+              <a:rPr lang="pt-BR" sz="500" dirty="0"/>
+              <a:t>Cumpre</a:t>
+            </a:r>
+          </a:p>
+        </p:txBody>
+      </p:sp>
+      <p:sp>
+        <p:nvSpPr>
+          <p:cNvPr id="59" name="CaixaDeTexto 58">
+            <a:extLst>
+              <a:ext uri="{FF2B5EF4-FFF2-40B4-BE49-F238E27FC236}">
+                <a16:creationId xmlns:a16="http://schemas.microsoft.com/office/drawing/2014/main" id="{C90C265C-F5C8-5241-A9AC-BED6EF262404}"/>
+              </a:ext>
+            </a:extLst>
+          </p:cNvPr>
+          <p:cNvSpPr txBox="1"/>
+          <p:nvPr/>
+        </p:nvSpPr>
+        <p:spPr>
+          <a:xfrm>
+            <a:off x="5662138" y="3435817"/>
+            <a:ext cx="761679" cy="246221"/>
+          </a:xfrm>
+          <a:prstGeom prst="rect">
+            <a:avLst/>
+          </a:prstGeom>
+          <a:noFill/>
+          <a:ln>
+            <a:noFill/>
+          </a:ln>
+        </p:spPr>
+        <p:txBody>
+          <a:bodyPr wrap="square" rtlCol="0">
+            <a:spAutoFit/>
+          </a:bodyPr>
+          <a:lstStyle/>
+          <a:p>
+            <a:pPr algn="ctr"/>
+            <a:r>
+              <a:rPr lang="pt-BR" sz="1000" b="1" dirty="0"/>
+              <a:t>(V-P*, </a:t>
+            </a:r>
+            <a:r>
+              <a:rPr lang="pt-BR" sz="1000" b="1" dirty="0" err="1"/>
+              <a:t>P</a:t>
+            </a:r>
+            <a:r>
+              <a:rPr lang="pt-BR" sz="1000" b="1" dirty="0"/>
+              <a:t>*)</a:t>
+            </a:r>
+          </a:p>
+        </p:txBody>
+      </p:sp>
+      <p:sp>
+        <p:nvSpPr>
+          <p:cNvPr id="60" name="CaixaDeTexto 59">
+            <a:extLst>
+              <a:ext uri="{FF2B5EF4-FFF2-40B4-BE49-F238E27FC236}">
+                <a16:creationId xmlns:a16="http://schemas.microsoft.com/office/drawing/2014/main" id="{FE621D25-530E-3C4B-B1E1-EA06E86A9659}"/>
+              </a:ext>
+            </a:extLst>
+          </p:cNvPr>
+          <p:cNvSpPr txBox="1"/>
+          <p:nvPr/>
+        </p:nvSpPr>
+        <p:spPr>
+          <a:xfrm>
+            <a:off x="6367267" y="3284936"/>
+            <a:ext cx="490022" cy="169277"/>
+          </a:xfrm>
+          <a:prstGeom prst="rect">
+            <a:avLst/>
+          </a:prstGeom>
+          <a:solidFill>
+            <a:schemeClr val="accent1">
+              <a:lumMod val="60000"/>
+              <a:lumOff val="40000"/>
+            </a:schemeClr>
+          </a:solidFill>
+        </p:spPr>
+        <p:txBody>
+          <a:bodyPr wrap="square" rtlCol="0">
+            <a:spAutoFit/>
+          </a:bodyPr>
+          <a:lstStyle/>
+          <a:p>
+            <a:pPr algn="ctr"/>
+            <a:r>
+              <a:rPr lang="pt-BR" sz="500" b="1" dirty="0"/>
+              <a:t>Descumpre</a:t>
+            </a:r>
+          </a:p>
+        </p:txBody>
+      </p:sp>
+      <p:sp>
+        <p:nvSpPr>
+          <p:cNvPr id="61" name="CaixaDeTexto 60">
+            <a:extLst>
+              <a:ext uri="{FF2B5EF4-FFF2-40B4-BE49-F238E27FC236}">
+                <a16:creationId xmlns:a16="http://schemas.microsoft.com/office/drawing/2014/main" id="{9522F430-FCB4-1B4C-B228-871D38F884C2}"/>
+              </a:ext>
+            </a:extLst>
+          </p:cNvPr>
+          <p:cNvSpPr txBox="1"/>
+          <p:nvPr/>
+        </p:nvSpPr>
+        <p:spPr>
+          <a:xfrm>
+            <a:off x="6330217" y="3427742"/>
+            <a:ext cx="570151" cy="246221"/>
+          </a:xfrm>
+          <a:prstGeom prst="rect">
+            <a:avLst/>
+          </a:prstGeom>
+          <a:noFill/>
+          <a:ln>
+            <a:noFill/>
+          </a:ln>
+        </p:spPr>
+        <p:txBody>
+          <a:bodyPr wrap="square" rtlCol="0">
+            <a:spAutoFit/>
+          </a:bodyPr>
+          <a:lstStyle/>
+          <a:p>
+            <a:pPr algn="ctr"/>
+            <a:r>
+              <a:rPr lang="pt-BR" sz="1000" b="1" dirty="0"/>
+              <a:t>(C, </a:t>
+            </a:r>
+            <a:r>
+              <a:rPr lang="pt-BR" sz="1000" b="1" dirty="0" err="1"/>
+              <a:t>P</a:t>
+            </a:r>
+            <a:r>
+              <a:rPr lang="pt-BR" sz="1000" b="1" dirty="0"/>
+              <a:t>’)</a:t>
+            </a:r>
+          </a:p>
+        </p:txBody>
+      </p:sp>
+      <p:sp>
+        <p:nvSpPr>
+          <p:cNvPr id="63" name="Balão Retangular 62">
+            <a:extLst>
+              <a:ext uri="{FF2B5EF4-FFF2-40B4-BE49-F238E27FC236}">
+                <a16:creationId xmlns:a16="http://schemas.microsoft.com/office/drawing/2014/main" id="{FF5C97FA-F778-DB41-87E0-612F94A6D3EE}"/>
+              </a:ext>
+            </a:extLst>
+          </p:cNvPr>
+          <p:cNvSpPr/>
+          <p:nvPr/>
+        </p:nvSpPr>
+        <p:spPr>
+          <a:xfrm>
+            <a:off x="6719293" y="3769771"/>
+            <a:ext cx="1324396" cy="246222"/>
+          </a:xfrm>
+          <a:prstGeom prst="wedgeRectCallout">
+            <a:avLst>
+              <a:gd name="adj1" fmla="val -9018"/>
+              <a:gd name="adj2" fmla="val -89203"/>
+            </a:avLst>
+          </a:prstGeom>
+        </p:spPr>
+        <p:style>
+          <a:lnRef idx="2">
+            <a:schemeClr val="accent2">
+              <a:shade val="50000"/>
+            </a:schemeClr>
+          </a:lnRef>
+          <a:fillRef idx="1">
+            <a:schemeClr val="accent2"/>
+          </a:fillRef>
+          <a:effectRef idx="0">
+            <a:schemeClr val="accent2"/>
+          </a:effectRef>
+          <a:fontRef idx="minor">
+            <a:schemeClr val="lt1"/>
+          </a:fontRef>
+        </p:style>
+        <p:txBody>
+          <a:bodyPr rtlCol="0" anchor="ctr"/>
+          <a:lstStyle/>
+          <a:p>
+            <a:pPr algn="ctr"/>
+            <a:r>
+              <a:rPr lang="pt-BR" sz="1200" dirty="0"/>
+              <a:t>Equilíbrio de Nash</a:t>
+            </a:r>
+          </a:p>
+        </p:txBody>
+      </p:sp>
+      <p:sp>
+        <p:nvSpPr>
+          <p:cNvPr id="64" name="CaixaDeTexto 63">
+            <a:extLst>
+              <a:ext uri="{FF2B5EF4-FFF2-40B4-BE49-F238E27FC236}">
+                <a16:creationId xmlns:a16="http://schemas.microsoft.com/office/drawing/2014/main" id="{A5C3DFDF-2449-2E49-9183-A85F25A4FEE9}"/>
+              </a:ext>
+            </a:extLst>
+          </p:cNvPr>
+          <p:cNvSpPr txBox="1"/>
+          <p:nvPr/>
+        </p:nvSpPr>
+        <p:spPr>
+          <a:xfrm>
+            <a:off x="6059541" y="2665710"/>
+            <a:ext cx="570151" cy="169277"/>
+          </a:xfrm>
+          <a:prstGeom prst="rect">
+            <a:avLst/>
+          </a:prstGeom>
+          <a:noFill/>
+          <a:ln>
+            <a:noFill/>
+          </a:ln>
+        </p:spPr>
+        <p:txBody>
+          <a:bodyPr wrap="square" rtlCol="0">
+            <a:spAutoFit/>
+          </a:bodyPr>
+          <a:lstStyle/>
+          <a:p>
+            <a:pPr algn="ctr"/>
+            <a:r>
+              <a:rPr lang="pt-BR" sz="500" b="1" dirty="0"/>
+              <a:t>COMPRADOR</a:t>
+            </a:r>
+          </a:p>
+        </p:txBody>
+      </p:sp>
+      <p:sp>
+        <p:nvSpPr>
+          <p:cNvPr id="68" name="Oval 67">
+            <a:extLst>
+              <a:ext uri="{FF2B5EF4-FFF2-40B4-BE49-F238E27FC236}">
+                <a16:creationId xmlns:a16="http://schemas.microsoft.com/office/drawing/2014/main" id="{3DBE0024-4131-4947-B997-D4180CAE332F}"/>
+              </a:ext>
+            </a:extLst>
+          </p:cNvPr>
+          <p:cNvSpPr/>
+          <p:nvPr/>
+        </p:nvSpPr>
+        <p:spPr>
+          <a:xfrm>
+            <a:off x="7848003" y="1171298"/>
+            <a:ext cx="72000" cy="72000"/>
+          </a:xfrm>
+          <a:prstGeom prst="ellipse">
+            <a:avLst/>
+          </a:prstGeom>
+          <a:solidFill>
+            <a:schemeClr val="tx1"/>
+          </a:solidFill>
+          <a:ln>
+            <a:solidFill>
+              <a:schemeClr val="tx1"/>
+            </a:solidFill>
+          </a:ln>
+        </p:spPr>
+        <p:style>
+          <a:lnRef idx="2">
+            <a:schemeClr val="accent1">
+              <a:shade val="50000"/>
+            </a:schemeClr>
+          </a:lnRef>
+          <a:fillRef idx="1">
+            <a:schemeClr val="accent1"/>
+          </a:fillRef>
+          <a:effectRef idx="0">
+            <a:schemeClr val="accent1"/>
+          </a:effectRef>
+          <a:fontRef idx="minor">
+            <a:schemeClr val="lt1"/>
+          </a:fontRef>
+        </p:style>
+        <p:txBody>
+          <a:bodyPr rtlCol="0" anchor="ctr"/>
+          <a:lstStyle/>
+          <a:p>
+            <a:pPr algn="ctr"/>
+            <a:endParaRPr lang="pt-BR" dirty="0"/>
+          </a:p>
+        </p:txBody>
+      </p:sp>
+      <p:pic>
+        <p:nvPicPr>
+          <p:cNvPr id="69" name="Gráfico 68" descr="Banco">
+            <a:extLst>
+              <a:ext uri="{FF2B5EF4-FFF2-40B4-BE49-F238E27FC236}">
+                <a16:creationId xmlns:a16="http://schemas.microsoft.com/office/drawing/2014/main" id="{8F296999-4F42-D340-BF7A-5D857BC2C0B3}"/>
+              </a:ext>
+            </a:extLst>
+          </p:cNvPr>
+          <p:cNvPicPr>
+            <a:picLocks noChangeAspect="1"/>
+          </p:cNvPicPr>
+          <p:nvPr/>
+        </p:nvPicPr>
+        <p:blipFill>
+          <a:blip r:embed="rId5">
+            <a:extLst>
+              <a:ext uri="{96DAC541-7B7A-43D3-8B79-37D633B846F1}">
+                <asvg:svgBlip xmlns:asvg="http://schemas.microsoft.com/office/drawing/2016/SVG/main" r:embed="rId6"/>
+              </a:ext>
+            </a:extLst>
+          </a:blip>
+          <a:stretch>
+            <a:fillRect/>
+          </a:stretch>
+        </p:blipFill>
+        <p:spPr>
+          <a:xfrm>
+            <a:off x="7650003" y="1171298"/>
+            <a:ext cx="468000" cy="468000"/>
+          </a:xfrm>
+          <a:prstGeom prst="rect">
+            <a:avLst/>
+          </a:prstGeom>
+        </p:spPr>
+      </p:pic>
+      <p:cxnSp>
+        <p:nvCxnSpPr>
+          <p:cNvPr id="70" name="Conector Reto 69">
+            <a:extLst>
+              <a:ext uri="{FF2B5EF4-FFF2-40B4-BE49-F238E27FC236}">
+                <a16:creationId xmlns:a16="http://schemas.microsoft.com/office/drawing/2014/main" id="{3D4E2A8C-C57C-1F43-AE1D-9B6C4A89C2B3}"/>
+              </a:ext>
+            </a:extLst>
+          </p:cNvPr>
+          <p:cNvCxnSpPr>
+            <a:stCxn id="5" idx="2"/>
+            <a:endCxn id="69" idx="0"/>
+          </p:cNvCxnSpPr>
+          <p:nvPr/>
+        </p:nvCxnSpPr>
+        <p:spPr>
+          <a:xfrm>
+            <a:off x="6095222" y="772378"/>
+            <a:ext cx="1788781" cy="398920"/>
+          </a:xfrm>
+          <a:prstGeom prst="line">
+            <a:avLst/>
+          </a:prstGeom>
+        </p:spPr>
+        <p:style>
+          <a:lnRef idx="1">
+            <a:schemeClr val="dk1"/>
+          </a:lnRef>
+          <a:fillRef idx="0">
+            <a:schemeClr val="dk1"/>
+          </a:fillRef>
+          <a:effectRef idx="0">
+            <a:schemeClr val="dk1"/>
+          </a:effectRef>
+          <a:fontRef idx="minor">
+            <a:schemeClr val="tx1"/>
+          </a:fontRef>
+        </p:style>
+      </p:cxnSp>
+      <p:sp>
+        <p:nvSpPr>
+          <p:cNvPr id="71" name="CaixaDeTexto 70">
+            <a:extLst>
+              <a:ext uri="{FF2B5EF4-FFF2-40B4-BE49-F238E27FC236}">
+                <a16:creationId xmlns:a16="http://schemas.microsoft.com/office/drawing/2014/main" id="{C1A0BEB4-0FA6-CA41-B36A-D70ACAAB5E54}"/>
+              </a:ext>
+            </a:extLst>
+          </p:cNvPr>
+          <p:cNvSpPr txBox="1"/>
+          <p:nvPr/>
+        </p:nvSpPr>
+        <p:spPr>
+          <a:xfrm>
+            <a:off x="7077822" y="892606"/>
+            <a:ext cx="815430" cy="169277"/>
+          </a:xfrm>
+          <a:prstGeom prst="rect">
+            <a:avLst/>
+          </a:prstGeom>
+          <a:solidFill>
+            <a:schemeClr val="bg1">
+              <a:lumMod val="85000"/>
+            </a:schemeClr>
+          </a:solidFill>
+        </p:spPr>
+        <p:txBody>
+          <a:bodyPr wrap="square" rtlCol="0">
+            <a:spAutoFit/>
+          </a:bodyPr>
+          <a:lstStyle/>
+          <a:p>
+            <a:pPr algn="ctr"/>
+            <a:r>
+              <a:rPr lang="pt-BR" sz="500" dirty="0"/>
+              <a:t>Financiamento Premium</a:t>
+            </a:r>
+          </a:p>
+        </p:txBody>
+      </p:sp>
+      <p:sp>
+        <p:nvSpPr>
+          <p:cNvPr id="72" name="CaixaDeTexto 71">
+            <a:extLst>
+              <a:ext uri="{FF2B5EF4-FFF2-40B4-BE49-F238E27FC236}">
+                <a16:creationId xmlns:a16="http://schemas.microsoft.com/office/drawing/2014/main" id="{F732A946-74FC-FC46-A585-F78DD5A7AA71}"/>
+              </a:ext>
+            </a:extLst>
+          </p:cNvPr>
+          <p:cNvSpPr txBox="1"/>
+          <p:nvPr/>
+        </p:nvSpPr>
+        <p:spPr>
+          <a:xfrm>
+            <a:off x="7592834" y="1574951"/>
+            <a:ext cx="570151" cy="246221"/>
+          </a:xfrm>
+          <a:prstGeom prst="rect">
+            <a:avLst/>
+          </a:prstGeom>
+          <a:noFill/>
+          <a:ln>
+            <a:noFill/>
+          </a:ln>
+        </p:spPr>
+        <p:txBody>
+          <a:bodyPr wrap="square" rtlCol="0">
+            <a:spAutoFit/>
+          </a:bodyPr>
+          <a:lstStyle/>
+          <a:p>
+            <a:pPr algn="ctr"/>
+            <a:r>
+              <a:rPr lang="pt-BR" sz="500" b="1" dirty="0"/>
+              <a:t>AGENTE FINANCEIRO</a:t>
+            </a:r>
+          </a:p>
+        </p:txBody>
+      </p:sp>
+      <p:cxnSp>
+        <p:nvCxnSpPr>
+          <p:cNvPr id="73" name="Conector Reto 72">
+            <a:extLst>
+              <a:ext uri="{FF2B5EF4-FFF2-40B4-BE49-F238E27FC236}">
+                <a16:creationId xmlns:a16="http://schemas.microsoft.com/office/drawing/2014/main" id="{86D3D0D9-FE83-F943-A806-90F046BBDE6B}"/>
+              </a:ext>
+            </a:extLst>
+          </p:cNvPr>
+          <p:cNvCxnSpPr>
+            <a:stCxn id="72" idx="2"/>
+            <a:endCxn id="78" idx="0"/>
+          </p:cNvCxnSpPr>
+          <p:nvPr/>
+        </p:nvCxnSpPr>
+        <p:spPr>
+          <a:xfrm flipH="1">
+            <a:off x="7629077" y="1821172"/>
+            <a:ext cx="248833" cy="400707"/>
+          </a:xfrm>
+          <a:prstGeom prst="line">
+            <a:avLst/>
+          </a:prstGeom>
+        </p:spPr>
+        <p:style>
+          <a:lnRef idx="1">
+            <a:schemeClr val="dk1"/>
+          </a:lnRef>
+          <a:fillRef idx="0">
+            <a:schemeClr val="dk1"/>
+          </a:fillRef>
+          <a:effectRef idx="0">
+            <a:schemeClr val="dk1"/>
+          </a:effectRef>
+          <a:fontRef idx="minor">
+            <a:schemeClr val="tx1"/>
+          </a:fontRef>
+        </p:style>
+      </p:cxnSp>
+      <p:cxnSp>
+        <p:nvCxnSpPr>
+          <p:cNvPr id="74" name="Conector Reto 73">
+            <a:extLst>
+              <a:ext uri="{FF2B5EF4-FFF2-40B4-BE49-F238E27FC236}">
+                <a16:creationId xmlns:a16="http://schemas.microsoft.com/office/drawing/2014/main" id="{F8C928D0-C3CE-354B-831D-D672D191B056}"/>
+              </a:ext>
+            </a:extLst>
+          </p:cNvPr>
+          <p:cNvCxnSpPr/>
+          <p:nvPr/>
+        </p:nvCxnSpPr>
+        <p:spPr>
+          <a:xfrm>
+            <a:off x="7884144" y="1821173"/>
+            <a:ext cx="285075" cy="400706"/>
+          </a:xfrm>
+          <a:prstGeom prst="line">
+            <a:avLst/>
+          </a:prstGeom>
+        </p:spPr>
+        <p:style>
+          <a:lnRef idx="1">
+            <a:schemeClr val="dk1"/>
+          </a:lnRef>
+          <a:fillRef idx="0">
+            <a:schemeClr val="dk1"/>
+          </a:fillRef>
+          <a:effectRef idx="0">
+            <a:schemeClr val="dk1"/>
+          </a:effectRef>
+          <a:fontRef idx="minor">
+            <a:schemeClr val="tx1"/>
+          </a:fontRef>
+        </p:style>
+      </p:cxnSp>
+      <p:sp>
+        <p:nvSpPr>
+          <p:cNvPr id="75" name="CaixaDeTexto 74">
+            <a:extLst>
+              <a:ext uri="{FF2B5EF4-FFF2-40B4-BE49-F238E27FC236}">
+                <a16:creationId xmlns:a16="http://schemas.microsoft.com/office/drawing/2014/main" id="{B7979FDF-BBC3-CA47-89F7-5DFF71DA149A}"/>
+              </a:ext>
+            </a:extLst>
+          </p:cNvPr>
+          <p:cNvSpPr txBox="1"/>
+          <p:nvPr/>
+        </p:nvSpPr>
+        <p:spPr>
+          <a:xfrm>
+            <a:off x="7365782" y="1958313"/>
+            <a:ext cx="375824" cy="169277"/>
+          </a:xfrm>
+          <a:prstGeom prst="rect">
+            <a:avLst/>
+          </a:prstGeom>
+          <a:solidFill>
+            <a:schemeClr val="bg1">
+              <a:lumMod val="85000"/>
+            </a:schemeClr>
+          </a:solidFill>
+        </p:spPr>
+        <p:txBody>
+          <a:bodyPr wrap="square" rtlCol="0">
+            <a:spAutoFit/>
+          </a:bodyPr>
+          <a:lstStyle/>
+          <a:p>
+            <a:pPr algn="ctr"/>
+            <a:r>
+              <a:rPr lang="pt-BR" sz="500" dirty="0"/>
+              <a:t>Aceita</a:t>
+            </a:r>
+          </a:p>
+        </p:txBody>
+      </p:sp>
+      <p:sp>
+        <p:nvSpPr>
+          <p:cNvPr id="76" name="CaixaDeTexto 75">
+            <a:extLst>
+              <a:ext uri="{FF2B5EF4-FFF2-40B4-BE49-F238E27FC236}">
+                <a16:creationId xmlns:a16="http://schemas.microsoft.com/office/drawing/2014/main" id="{9929F8AC-0A0E-7441-8EFA-74AA35544E3B}"/>
+              </a:ext>
+            </a:extLst>
+          </p:cNvPr>
+          <p:cNvSpPr txBox="1"/>
+          <p:nvPr/>
+        </p:nvSpPr>
+        <p:spPr>
+          <a:xfrm>
+            <a:off x="8034471" y="1958196"/>
+            <a:ext cx="375824" cy="169277"/>
+          </a:xfrm>
+          <a:prstGeom prst="rect">
+            <a:avLst/>
+          </a:prstGeom>
+          <a:solidFill>
+            <a:schemeClr val="accent2">
+              <a:lumMod val="60000"/>
+              <a:lumOff val="40000"/>
+            </a:schemeClr>
+          </a:solidFill>
+        </p:spPr>
+        <p:txBody>
+          <a:bodyPr wrap="square" rtlCol="0">
+            <a:spAutoFit/>
+          </a:bodyPr>
+          <a:lstStyle/>
+          <a:p>
+            <a:pPr algn="ctr"/>
+            <a:r>
+              <a:rPr lang="pt-BR" sz="500" dirty="0"/>
+              <a:t>Rejeita</a:t>
+            </a:r>
+          </a:p>
+        </p:txBody>
+      </p:sp>
+      <p:sp>
+        <p:nvSpPr>
+          <p:cNvPr id="77" name="CaixaDeTexto 76">
+            <a:extLst>
+              <a:ext uri="{FF2B5EF4-FFF2-40B4-BE49-F238E27FC236}">
+                <a16:creationId xmlns:a16="http://schemas.microsoft.com/office/drawing/2014/main" id="{3DB03A9B-359A-8F42-970A-A6C52C9E1413}"/>
+              </a:ext>
+            </a:extLst>
+          </p:cNvPr>
+          <p:cNvSpPr txBox="1"/>
+          <p:nvPr/>
+        </p:nvSpPr>
+        <p:spPr>
+          <a:xfrm>
+            <a:off x="7884144" y="2189625"/>
+            <a:ext cx="570151" cy="246221"/>
+          </a:xfrm>
+          <a:prstGeom prst="rect">
+            <a:avLst/>
+          </a:prstGeom>
+          <a:noFill/>
+          <a:ln>
+            <a:noFill/>
+          </a:ln>
+        </p:spPr>
+        <p:txBody>
+          <a:bodyPr wrap="square" rtlCol="0">
+            <a:spAutoFit/>
+          </a:bodyPr>
+          <a:lstStyle/>
+          <a:p>
+            <a:pPr algn="ctr"/>
+            <a:r>
+              <a:rPr lang="pt-BR" sz="1000" b="1" dirty="0"/>
+              <a:t>(0, 0)</a:t>
+            </a:r>
+          </a:p>
+        </p:txBody>
+      </p:sp>
+      <p:pic>
+        <p:nvPicPr>
+          <p:cNvPr id="78" name="Gráfico 77" descr="Homem">
+            <a:extLst>
+              <a:ext uri="{FF2B5EF4-FFF2-40B4-BE49-F238E27FC236}">
+                <a16:creationId xmlns:a16="http://schemas.microsoft.com/office/drawing/2014/main" id="{FDC5C5A0-5AB2-E144-89C1-0A224E5B52F5}"/>
+              </a:ext>
+            </a:extLst>
+          </p:cNvPr>
+          <p:cNvPicPr>
+            <a:picLocks noChangeAspect="1"/>
+          </p:cNvPicPr>
+          <p:nvPr/>
+        </p:nvPicPr>
+        <p:blipFill>
+          <a:blip r:embed="rId3">
+            <a:extLst>
+              <a:ext uri="{96DAC541-7B7A-43D3-8B79-37D633B846F1}">
+                <asvg:svgBlip xmlns:asvg="http://schemas.microsoft.com/office/drawing/2016/SVG/main" r:embed="rId4"/>
+              </a:ext>
+            </a:extLst>
+          </a:blip>
+          <a:stretch>
+            <a:fillRect/>
+          </a:stretch>
+        </p:blipFill>
+        <p:spPr>
+          <a:xfrm>
+            <a:off x="7394298" y="2221879"/>
+            <a:ext cx="469557" cy="469557"/>
+          </a:xfrm>
+          <a:prstGeom prst="rect">
+            <a:avLst/>
+          </a:prstGeom>
+        </p:spPr>
+      </p:pic>
+      <p:cxnSp>
+        <p:nvCxnSpPr>
+          <p:cNvPr id="79" name="Conector Reto 78">
+            <a:extLst>
+              <a:ext uri="{FF2B5EF4-FFF2-40B4-BE49-F238E27FC236}">
+                <a16:creationId xmlns:a16="http://schemas.microsoft.com/office/drawing/2014/main" id="{E613FA71-08D8-C541-818C-3824D76591C0}"/>
+              </a:ext>
+            </a:extLst>
+          </p:cNvPr>
+          <p:cNvCxnSpPr/>
+          <p:nvPr/>
+        </p:nvCxnSpPr>
+        <p:spPr>
+          <a:xfrm flipH="1">
+            <a:off x="7314078" y="2790102"/>
+            <a:ext cx="292705" cy="486735"/>
+          </a:xfrm>
+          <a:prstGeom prst="line">
+            <a:avLst/>
+          </a:prstGeom>
+        </p:spPr>
+        <p:style>
+          <a:lnRef idx="1">
+            <a:schemeClr val="dk1"/>
+          </a:lnRef>
+          <a:fillRef idx="0">
+            <a:schemeClr val="dk1"/>
+          </a:fillRef>
+          <a:effectRef idx="0">
+            <a:schemeClr val="dk1"/>
+          </a:effectRef>
+          <a:fontRef idx="minor">
+            <a:schemeClr val="tx1"/>
+          </a:fontRef>
+        </p:style>
+      </p:cxnSp>
+      <p:cxnSp>
+        <p:nvCxnSpPr>
+          <p:cNvPr id="80" name="Conector Reto 79">
+            <a:extLst>
+              <a:ext uri="{FF2B5EF4-FFF2-40B4-BE49-F238E27FC236}">
+                <a16:creationId xmlns:a16="http://schemas.microsoft.com/office/drawing/2014/main" id="{0AB992F8-1F9E-B14D-A020-8A5E1F624F1D}"/>
+              </a:ext>
+            </a:extLst>
+          </p:cNvPr>
+          <p:cNvCxnSpPr/>
+          <p:nvPr/>
+        </p:nvCxnSpPr>
+        <p:spPr>
+          <a:xfrm>
+            <a:off x="7606783" y="2790102"/>
+            <a:ext cx="286469" cy="486735"/>
+          </a:xfrm>
+          <a:prstGeom prst="line">
+            <a:avLst/>
+          </a:prstGeom>
+        </p:spPr>
+        <p:style>
+          <a:lnRef idx="1">
+            <a:schemeClr val="dk1"/>
+          </a:lnRef>
+          <a:fillRef idx="0">
+            <a:schemeClr val="dk1"/>
+          </a:fillRef>
+          <a:effectRef idx="0">
+            <a:schemeClr val="dk1"/>
+          </a:effectRef>
+          <a:fontRef idx="minor">
+            <a:schemeClr val="tx1"/>
+          </a:fontRef>
+        </p:style>
+      </p:cxnSp>
+      <p:sp>
+        <p:nvSpPr>
+          <p:cNvPr id="81" name="CaixaDeTexto 80">
+            <a:extLst>
+              <a:ext uri="{FF2B5EF4-FFF2-40B4-BE49-F238E27FC236}">
+                <a16:creationId xmlns:a16="http://schemas.microsoft.com/office/drawing/2014/main" id="{4EEAC1ED-3845-0E4F-977D-A69AF277F4D7}"/>
+              </a:ext>
+            </a:extLst>
+          </p:cNvPr>
+          <p:cNvSpPr txBox="1"/>
+          <p:nvPr/>
+        </p:nvSpPr>
+        <p:spPr>
+          <a:xfrm>
+            <a:off x="7095583" y="3274314"/>
+            <a:ext cx="409895" cy="169277"/>
+          </a:xfrm>
+          <a:prstGeom prst="rect">
+            <a:avLst/>
+          </a:prstGeom>
+          <a:solidFill>
+            <a:schemeClr val="bg1">
+              <a:lumMod val="85000"/>
+            </a:schemeClr>
+          </a:solidFill>
+        </p:spPr>
+        <p:txBody>
+          <a:bodyPr wrap="square" rtlCol="0">
+            <a:spAutoFit/>
+          </a:bodyPr>
+          <a:lstStyle/>
+          <a:p>
+            <a:pPr algn="ctr"/>
+            <a:r>
+              <a:rPr lang="pt-BR" sz="500" dirty="0"/>
+              <a:t>Cumpre</a:t>
+            </a:r>
+          </a:p>
+        </p:txBody>
+      </p:sp>
+      <p:sp>
+        <p:nvSpPr>
+          <p:cNvPr id="82" name="CaixaDeTexto 81">
+            <a:extLst>
+              <a:ext uri="{FF2B5EF4-FFF2-40B4-BE49-F238E27FC236}">
+                <a16:creationId xmlns:a16="http://schemas.microsoft.com/office/drawing/2014/main" id="{17D4438C-59C0-E24E-9C49-D8E734CA863B}"/>
+              </a:ext>
+            </a:extLst>
+          </p:cNvPr>
+          <p:cNvSpPr txBox="1"/>
+          <p:nvPr/>
+        </p:nvSpPr>
+        <p:spPr>
+          <a:xfrm>
+            <a:off x="6933745" y="3423838"/>
+            <a:ext cx="761679" cy="246221"/>
+          </a:xfrm>
+          <a:prstGeom prst="rect">
+            <a:avLst/>
+          </a:prstGeom>
+          <a:noFill/>
+          <a:ln>
+            <a:noFill/>
+          </a:ln>
+        </p:spPr>
+        <p:txBody>
+          <a:bodyPr wrap="square" rtlCol="0">
+            <a:spAutoFit/>
+          </a:bodyPr>
+          <a:lstStyle/>
+          <a:p>
+            <a:pPr algn="ctr"/>
+            <a:r>
+              <a:rPr lang="pt-BR" sz="1000" b="1" dirty="0"/>
+              <a:t>(V-P~, </a:t>
+            </a:r>
+            <a:r>
+              <a:rPr lang="pt-BR" sz="1000" b="1" dirty="0" err="1"/>
+              <a:t>P</a:t>
+            </a:r>
+            <a:r>
+              <a:rPr lang="pt-BR" sz="1000" b="1" dirty="0"/>
+              <a:t>~)</a:t>
+            </a:r>
+          </a:p>
+        </p:txBody>
+      </p:sp>
+      <p:sp>
+        <p:nvSpPr>
+          <p:cNvPr id="83" name="CaixaDeTexto 82">
+            <a:extLst>
+              <a:ext uri="{FF2B5EF4-FFF2-40B4-BE49-F238E27FC236}">
+                <a16:creationId xmlns:a16="http://schemas.microsoft.com/office/drawing/2014/main" id="{C335823F-7863-EC47-B35F-B5575B353AB5}"/>
+              </a:ext>
+            </a:extLst>
+          </p:cNvPr>
+          <p:cNvSpPr txBox="1"/>
+          <p:nvPr/>
+        </p:nvSpPr>
+        <p:spPr>
+          <a:xfrm>
+            <a:off x="7652345" y="3270185"/>
+            <a:ext cx="490022" cy="169277"/>
+          </a:xfrm>
+          <a:prstGeom prst="rect">
+            <a:avLst/>
+          </a:prstGeom>
+          <a:solidFill>
+            <a:schemeClr val="accent1">
+              <a:lumMod val="60000"/>
+              <a:lumOff val="40000"/>
+            </a:schemeClr>
+          </a:solidFill>
+        </p:spPr>
+        <p:txBody>
+          <a:bodyPr wrap="square" rtlCol="0">
+            <a:spAutoFit/>
+          </a:bodyPr>
+          <a:lstStyle/>
+          <a:p>
+            <a:pPr algn="ctr"/>
+            <a:r>
+              <a:rPr lang="pt-BR" sz="500" b="1" dirty="0"/>
+              <a:t>Descumpre</a:t>
+            </a:r>
+          </a:p>
+        </p:txBody>
+      </p:sp>
+      <p:sp>
+        <p:nvSpPr>
+          <p:cNvPr id="84" name="CaixaDeTexto 83">
+            <a:extLst>
+              <a:ext uri="{FF2B5EF4-FFF2-40B4-BE49-F238E27FC236}">
+                <a16:creationId xmlns:a16="http://schemas.microsoft.com/office/drawing/2014/main" id="{1C344DED-2898-9543-8938-92785DC13A3A}"/>
+              </a:ext>
+            </a:extLst>
+          </p:cNvPr>
+          <p:cNvSpPr txBox="1"/>
+          <p:nvPr/>
+        </p:nvSpPr>
+        <p:spPr>
+          <a:xfrm>
+            <a:off x="7330641" y="2660977"/>
+            <a:ext cx="570151" cy="169277"/>
+          </a:xfrm>
+          <a:prstGeom prst="rect">
+            <a:avLst/>
+          </a:prstGeom>
+          <a:noFill/>
+          <a:ln>
+            <a:noFill/>
+          </a:ln>
+        </p:spPr>
+        <p:txBody>
+          <a:bodyPr wrap="square" rtlCol="0">
+            <a:spAutoFit/>
+          </a:bodyPr>
+          <a:lstStyle/>
+          <a:p>
+            <a:pPr algn="ctr"/>
+            <a:r>
+              <a:rPr lang="pt-BR" sz="500" b="1" dirty="0"/>
+              <a:t>COMPRADOR</a:t>
+            </a:r>
+          </a:p>
+        </p:txBody>
+      </p:sp>
+      <p:sp>
+        <p:nvSpPr>
+          <p:cNvPr id="85" name="CaixaDeTexto 84">
+            <a:extLst>
+              <a:ext uri="{FF2B5EF4-FFF2-40B4-BE49-F238E27FC236}">
+                <a16:creationId xmlns:a16="http://schemas.microsoft.com/office/drawing/2014/main" id="{5B465ED7-00FB-A844-B654-050FB7AD7E50}"/>
+              </a:ext>
+            </a:extLst>
+          </p:cNvPr>
+          <p:cNvSpPr txBox="1"/>
+          <p:nvPr/>
+        </p:nvSpPr>
+        <p:spPr>
+          <a:xfrm>
+            <a:off x="7626261" y="3415514"/>
+            <a:ext cx="570151" cy="246221"/>
+          </a:xfrm>
+          <a:prstGeom prst="rect">
+            <a:avLst/>
+          </a:prstGeom>
+          <a:noFill/>
+          <a:ln>
+            <a:noFill/>
+          </a:ln>
+        </p:spPr>
+        <p:txBody>
+          <a:bodyPr wrap="square" rtlCol="0">
+            <a:spAutoFit/>
+          </a:bodyPr>
+          <a:lstStyle/>
+          <a:p>
+            <a:pPr algn="ctr"/>
+            <a:r>
+              <a:rPr lang="pt-BR" sz="1000" b="1" dirty="0"/>
+              <a:t>(𝛅, ∈)</a:t>
+            </a:r>
+          </a:p>
+        </p:txBody>
+      </p:sp>
+    </p:spTree>
+    <p:extLst>
+      <p:ext uri="{BB962C8B-B14F-4D97-AF65-F5344CB8AC3E}">
+        <p14:creationId xmlns:p14="http://schemas.microsoft.com/office/powerpoint/2010/main" val="1296107062"/>
+      </p:ext>
+    </p:extLst>
+  </p:cSld>
+  <p:clrMapOvr>
+    <a:masterClrMapping/>
+  </p:clrMapOvr>
+</p:sld>
+</file>
+
+<file path=ppt/slides/slide4.xml><?xml version="1.0" encoding="utf-8"?>
+<p:sld xmlns:a="http://schemas.openxmlformats.org/drawingml/2006/main" xmlns:r="http://schemas.openxmlformats.org/officeDocument/2006/relationships" xmlns:p="http://schemas.openxmlformats.org/presentationml/2006/main">
+  <p:cSld>
+    <p:spTree>
+      <p:nvGrpSpPr>
+        <p:cNvPr id="1" name=""/>
+        <p:cNvGrpSpPr/>
+        <p:nvPr/>
+      </p:nvGrpSpPr>
+      <p:grpSpPr>
+        <a:xfrm>
+          <a:off x="0" y="0"/>
+          <a:ext cx="0" cy="0"/>
+          <a:chOff x="0" y="0"/>
+          <a:chExt cx="0" cy="0"/>
+        </a:xfrm>
+      </p:grpSpPr>
+      <p:pic>
+        <p:nvPicPr>
+          <p:cNvPr id="5" name="Gráfico 4" descr="Homem">
+            <a:extLst>
+              <a:ext uri="{FF2B5EF4-FFF2-40B4-BE49-F238E27FC236}">
+                <a16:creationId xmlns:a16="http://schemas.microsoft.com/office/drawing/2014/main" id="{DB2EEF8D-E089-EB4C-A67B-279815042145}"/>
+              </a:ext>
+            </a:extLst>
+          </p:cNvPr>
+          <p:cNvPicPr>
+            <a:picLocks noChangeAspect="1"/>
+          </p:cNvPicPr>
+          <p:nvPr/>
+        </p:nvPicPr>
+        <p:blipFill>
+          <a:blip r:embed="rId3">
+            <a:extLst>
+              <a:ext uri="{96DAC541-7B7A-43D3-8B79-37D633B846F1}">
+                <asvg:svgBlip xmlns:asvg="http://schemas.microsoft.com/office/drawing/2016/SVG/main" r:embed="rId4"/>
+              </a:ext>
+            </a:extLst>
+          </a:blip>
+          <a:stretch>
+            <a:fillRect/>
+          </a:stretch>
+        </p:blipFill>
+        <p:spPr>
+          <a:xfrm>
+            <a:off x="5860443" y="302821"/>
+            <a:ext cx="469557" cy="469557"/>
+          </a:xfrm>
+          <a:prstGeom prst="rect">
+            <a:avLst/>
+          </a:prstGeom>
+        </p:spPr>
+      </p:pic>
+      <p:pic>
+        <p:nvPicPr>
+          <p:cNvPr id="7" name="Gráfico 6" descr="Banco">
+            <a:extLst>
+              <a:ext uri="{FF2B5EF4-FFF2-40B4-BE49-F238E27FC236}">
+                <a16:creationId xmlns:a16="http://schemas.microsoft.com/office/drawing/2014/main" id="{697595F5-5062-D04B-8897-7E431C62E912}"/>
+              </a:ext>
+            </a:extLst>
+          </p:cNvPr>
+          <p:cNvPicPr>
+            <a:picLocks noChangeAspect="1"/>
+          </p:cNvPicPr>
+          <p:nvPr/>
+        </p:nvPicPr>
+        <p:blipFill>
+          <a:blip r:embed="rId5">
+            <a:extLst>
+              <a:ext uri="{96DAC541-7B7A-43D3-8B79-37D633B846F1}">
+                <asvg:svgBlip xmlns:asvg="http://schemas.microsoft.com/office/drawing/2016/SVG/main" r:embed="rId6"/>
+              </a:ext>
+            </a:extLst>
+          </a:blip>
+          <a:stretch>
+            <a:fillRect/>
+          </a:stretch>
+        </p:blipFill>
+        <p:spPr>
+          <a:xfrm>
+            <a:off x="4413123" y="1176032"/>
+            <a:ext cx="468000" cy="468000"/>
+          </a:xfrm>
+          <a:prstGeom prst="rect">
+            <a:avLst/>
+          </a:prstGeom>
+        </p:spPr>
+      </p:pic>
+      <p:sp>
+        <p:nvSpPr>
+          <p:cNvPr id="8" name="Oval 7">
+            <a:extLst>
+              <a:ext uri="{FF2B5EF4-FFF2-40B4-BE49-F238E27FC236}">
+                <a16:creationId xmlns:a16="http://schemas.microsoft.com/office/drawing/2014/main" id="{D48A0FCB-94F9-F44A-AB87-1AE7845D7BA1}"/>
+              </a:ext>
+            </a:extLst>
+          </p:cNvPr>
+          <p:cNvSpPr/>
+          <p:nvPr/>
+        </p:nvSpPr>
+        <p:spPr>
+          <a:xfrm>
+            <a:off x="4611123" y="1176032"/>
+            <a:ext cx="72000" cy="72000"/>
+          </a:xfrm>
+          <a:prstGeom prst="ellipse">
+            <a:avLst/>
+          </a:prstGeom>
+          <a:solidFill>
+            <a:schemeClr val="tx1"/>
+          </a:solidFill>
+          <a:ln>
+            <a:solidFill>
+              <a:schemeClr val="tx1"/>
+            </a:solidFill>
+          </a:ln>
+        </p:spPr>
+        <p:style>
+          <a:lnRef idx="2">
+            <a:schemeClr val="accent1">
+              <a:shade val="50000"/>
+            </a:schemeClr>
+          </a:lnRef>
+          <a:fillRef idx="1">
+            <a:schemeClr val="accent1"/>
+          </a:fillRef>
+          <a:effectRef idx="0">
+            <a:schemeClr val="accent1"/>
+          </a:effectRef>
+          <a:fontRef idx="minor">
+            <a:schemeClr val="lt1"/>
+          </a:fontRef>
+        </p:style>
+        <p:txBody>
+          <a:bodyPr rtlCol="0" anchor="ctr"/>
+          <a:lstStyle/>
+          <a:p>
+            <a:pPr algn="ctr"/>
+            <a:endParaRPr lang="pt-BR" dirty="0"/>
+          </a:p>
+        </p:txBody>
+      </p:sp>
+      <p:sp>
+        <p:nvSpPr>
+          <p:cNvPr id="9" name="Oval 8">
+            <a:extLst>
+              <a:ext uri="{FF2B5EF4-FFF2-40B4-BE49-F238E27FC236}">
+                <a16:creationId xmlns:a16="http://schemas.microsoft.com/office/drawing/2014/main" id="{45FC7F3F-EF59-1F4C-95CD-260D42B079BE}"/>
+              </a:ext>
+            </a:extLst>
+          </p:cNvPr>
+          <p:cNvSpPr/>
+          <p:nvPr/>
+        </p:nvSpPr>
+        <p:spPr>
+          <a:xfrm>
+            <a:off x="6060499" y="1176032"/>
+            <a:ext cx="72000" cy="72000"/>
+          </a:xfrm>
+          <a:prstGeom prst="ellipse">
+            <a:avLst/>
+          </a:prstGeom>
+          <a:solidFill>
+            <a:schemeClr val="tx1"/>
+          </a:solidFill>
+          <a:ln>
+            <a:solidFill>
+              <a:schemeClr val="tx1"/>
+            </a:solidFill>
+          </a:ln>
+        </p:spPr>
+        <p:style>
+          <a:lnRef idx="2">
+            <a:schemeClr val="accent1">
+              <a:shade val="50000"/>
+            </a:schemeClr>
+          </a:lnRef>
+          <a:fillRef idx="1">
+            <a:schemeClr val="accent1"/>
+          </a:fillRef>
+          <a:effectRef idx="0">
+            <a:schemeClr val="accent1"/>
+          </a:effectRef>
+          <a:fontRef idx="minor">
+            <a:schemeClr val="lt1"/>
+          </a:fontRef>
+        </p:style>
+        <p:txBody>
+          <a:bodyPr rtlCol="0" anchor="ctr"/>
+          <a:lstStyle/>
+          <a:p>
+            <a:pPr algn="ctr"/>
+            <a:endParaRPr lang="pt-BR" dirty="0"/>
+          </a:p>
+        </p:txBody>
+      </p:sp>
+      <p:sp>
+        <p:nvSpPr>
+          <p:cNvPr id="10" name="Oval 9">
+            <a:extLst>
+              <a:ext uri="{FF2B5EF4-FFF2-40B4-BE49-F238E27FC236}">
+                <a16:creationId xmlns:a16="http://schemas.microsoft.com/office/drawing/2014/main" id="{D5050182-889E-0A4D-889B-4C34E5DC25A5}"/>
+              </a:ext>
+            </a:extLst>
+          </p:cNvPr>
+          <p:cNvSpPr/>
+          <p:nvPr/>
+        </p:nvSpPr>
+        <p:spPr>
+          <a:xfrm>
+            <a:off x="7563873" y="1176032"/>
+            <a:ext cx="72000" cy="72000"/>
+          </a:xfrm>
+          <a:prstGeom prst="ellipse">
+            <a:avLst/>
+          </a:prstGeom>
+          <a:solidFill>
+            <a:schemeClr val="tx1"/>
+          </a:solidFill>
+          <a:ln>
+            <a:solidFill>
+              <a:schemeClr val="tx1"/>
+            </a:solidFill>
+          </a:ln>
+        </p:spPr>
+        <p:style>
+          <a:lnRef idx="2">
+            <a:schemeClr val="accent1">
+              <a:shade val="50000"/>
+            </a:schemeClr>
+          </a:lnRef>
+          <a:fillRef idx="1">
+            <a:schemeClr val="accent1"/>
+          </a:fillRef>
+          <a:effectRef idx="0">
+            <a:schemeClr val="accent1"/>
+          </a:effectRef>
+          <a:fontRef idx="minor">
+            <a:schemeClr val="lt1"/>
+          </a:fontRef>
+        </p:style>
+        <p:txBody>
+          <a:bodyPr rtlCol="0" anchor="ctr"/>
+          <a:lstStyle/>
+          <a:p>
+            <a:pPr algn="ctr"/>
+            <a:endParaRPr lang="pt-BR" dirty="0"/>
+          </a:p>
+        </p:txBody>
+      </p:sp>
+      <p:pic>
+        <p:nvPicPr>
+          <p:cNvPr id="11" name="Gráfico 10" descr="Banco">
+            <a:extLst>
+              <a:ext uri="{FF2B5EF4-FFF2-40B4-BE49-F238E27FC236}">
+                <a16:creationId xmlns:a16="http://schemas.microsoft.com/office/drawing/2014/main" id="{D94AC31F-A6A0-8144-8B7D-57D776F1F4D7}"/>
+              </a:ext>
+            </a:extLst>
+          </p:cNvPr>
+          <p:cNvPicPr>
+            <a:picLocks noChangeAspect="1"/>
+          </p:cNvPicPr>
+          <p:nvPr/>
+        </p:nvPicPr>
+        <p:blipFill>
+          <a:blip r:embed="rId5">
+            <a:extLst>
+              <a:ext uri="{96DAC541-7B7A-43D3-8B79-37D633B846F1}">
+                <asvg:svgBlip xmlns:asvg="http://schemas.microsoft.com/office/drawing/2016/SVG/main" r:embed="rId6"/>
+              </a:ext>
+            </a:extLst>
+          </a:blip>
+          <a:stretch>
+            <a:fillRect/>
+          </a:stretch>
+        </p:blipFill>
+        <p:spPr>
+          <a:xfrm>
+            <a:off x="5862000" y="1178980"/>
+            <a:ext cx="468000" cy="468000"/>
+          </a:xfrm>
+          <a:prstGeom prst="rect">
+            <a:avLst/>
+          </a:prstGeom>
+        </p:spPr>
+      </p:pic>
+      <p:pic>
+        <p:nvPicPr>
+          <p:cNvPr id="12" name="Gráfico 11" descr="Banco">
+            <a:extLst>
+              <a:ext uri="{FF2B5EF4-FFF2-40B4-BE49-F238E27FC236}">
+                <a16:creationId xmlns:a16="http://schemas.microsoft.com/office/drawing/2014/main" id="{935A63D5-40F1-544F-84DF-AFC16C3531E4}"/>
+              </a:ext>
+            </a:extLst>
+          </p:cNvPr>
+          <p:cNvPicPr>
+            <a:picLocks noChangeAspect="1"/>
+          </p:cNvPicPr>
+          <p:nvPr/>
+        </p:nvPicPr>
+        <p:blipFill>
+          <a:blip r:embed="rId5">
+            <a:extLst>
+              <a:ext uri="{96DAC541-7B7A-43D3-8B79-37D633B846F1}">
+                <asvg:svgBlip xmlns:asvg="http://schemas.microsoft.com/office/drawing/2016/SVG/main" r:embed="rId6"/>
+              </a:ext>
+            </a:extLst>
+          </a:blip>
+          <a:stretch>
+            <a:fillRect/>
+          </a:stretch>
+        </p:blipFill>
+        <p:spPr>
+          <a:xfrm>
+            <a:off x="7365873" y="1176032"/>
+            <a:ext cx="468000" cy="468000"/>
+          </a:xfrm>
+          <a:prstGeom prst="rect">
+            <a:avLst/>
+          </a:prstGeom>
+        </p:spPr>
+      </p:pic>
+      <p:cxnSp>
+        <p:nvCxnSpPr>
+          <p:cNvPr id="14" name="Conector Reto 13">
+            <a:extLst>
+              <a:ext uri="{FF2B5EF4-FFF2-40B4-BE49-F238E27FC236}">
+                <a16:creationId xmlns:a16="http://schemas.microsoft.com/office/drawing/2014/main" id="{0F2231F7-2895-7242-9F3A-408AD2BAD302}"/>
+              </a:ext>
+            </a:extLst>
+          </p:cNvPr>
+          <p:cNvCxnSpPr>
+            <a:stCxn id="5" idx="2"/>
+            <a:endCxn id="8" idx="0"/>
+          </p:cNvCxnSpPr>
+          <p:nvPr/>
+        </p:nvCxnSpPr>
+        <p:spPr>
+          <a:xfrm flipH="1">
+            <a:off x="4647123" y="772378"/>
+            <a:ext cx="1448099" cy="403654"/>
+          </a:xfrm>
+          <a:prstGeom prst="line">
+            <a:avLst/>
+          </a:prstGeom>
+        </p:spPr>
+        <p:style>
+          <a:lnRef idx="1">
+            <a:schemeClr val="dk1"/>
+          </a:lnRef>
+          <a:fillRef idx="0">
+            <a:schemeClr val="dk1"/>
+          </a:fillRef>
+          <a:effectRef idx="0">
+            <a:schemeClr val="dk1"/>
+          </a:effectRef>
+          <a:fontRef idx="minor">
+            <a:schemeClr val="tx1"/>
+          </a:fontRef>
+        </p:style>
+      </p:cxnSp>
+      <p:cxnSp>
+        <p:nvCxnSpPr>
+          <p:cNvPr id="16" name="Conector Reto 15">
+            <a:extLst>
+              <a:ext uri="{FF2B5EF4-FFF2-40B4-BE49-F238E27FC236}">
+                <a16:creationId xmlns:a16="http://schemas.microsoft.com/office/drawing/2014/main" id="{5F72473E-DEF4-4146-977B-E562463B95EC}"/>
+              </a:ext>
+            </a:extLst>
+          </p:cNvPr>
+          <p:cNvCxnSpPr>
+            <a:stCxn id="5" idx="2"/>
+            <a:endCxn id="11" idx="0"/>
+          </p:cNvCxnSpPr>
+          <p:nvPr/>
+        </p:nvCxnSpPr>
+        <p:spPr>
+          <a:xfrm>
+            <a:off x="6095222" y="772378"/>
+            <a:ext cx="778" cy="406602"/>
+          </a:xfrm>
+          <a:prstGeom prst="line">
+            <a:avLst/>
+          </a:prstGeom>
+        </p:spPr>
+        <p:style>
+          <a:lnRef idx="1">
+            <a:schemeClr val="dk1"/>
+          </a:lnRef>
+          <a:fillRef idx="0">
+            <a:schemeClr val="dk1"/>
+          </a:fillRef>
+          <a:effectRef idx="0">
+            <a:schemeClr val="dk1"/>
+          </a:effectRef>
+          <a:fontRef idx="minor">
+            <a:schemeClr val="tx1"/>
+          </a:fontRef>
+        </p:style>
+      </p:cxnSp>
+      <p:cxnSp>
+        <p:nvCxnSpPr>
+          <p:cNvPr id="18" name="Conector Reto 17">
+            <a:extLst>
+              <a:ext uri="{FF2B5EF4-FFF2-40B4-BE49-F238E27FC236}">
+                <a16:creationId xmlns:a16="http://schemas.microsoft.com/office/drawing/2014/main" id="{9FE6A757-066B-F243-B4F8-147B783598DC}"/>
+              </a:ext>
+            </a:extLst>
+          </p:cNvPr>
+          <p:cNvCxnSpPr>
+            <a:stCxn id="5" idx="2"/>
+            <a:endCxn id="12" idx="0"/>
+          </p:cNvCxnSpPr>
+          <p:nvPr/>
+        </p:nvCxnSpPr>
+        <p:spPr>
+          <a:xfrm>
+            <a:off x="6095222" y="772378"/>
+            <a:ext cx="1504651" cy="403654"/>
+          </a:xfrm>
+          <a:prstGeom prst="line">
+            <a:avLst/>
+          </a:prstGeom>
+        </p:spPr>
+        <p:style>
+          <a:lnRef idx="1">
+            <a:schemeClr val="dk1"/>
+          </a:lnRef>
+          <a:fillRef idx="0">
+            <a:schemeClr val="dk1"/>
+          </a:fillRef>
+          <a:effectRef idx="0">
+            <a:schemeClr val="dk1"/>
+          </a:effectRef>
+          <a:fontRef idx="minor">
+            <a:schemeClr val="tx1"/>
+          </a:fontRef>
+        </p:style>
+      </p:cxnSp>
+      <p:sp>
+        <p:nvSpPr>
+          <p:cNvPr id="19" name="CaixaDeTexto 18">
+            <a:extLst>
+              <a:ext uri="{FF2B5EF4-FFF2-40B4-BE49-F238E27FC236}">
+                <a16:creationId xmlns:a16="http://schemas.microsoft.com/office/drawing/2014/main" id="{B3D734B3-91E8-A54E-B0BF-6A5F47460754}"/>
+              </a:ext>
+            </a:extLst>
+          </p:cNvPr>
+          <p:cNvSpPr txBox="1"/>
+          <p:nvPr/>
+        </p:nvSpPr>
+        <p:spPr>
+          <a:xfrm>
+            <a:off x="5813805" y="889566"/>
+            <a:ext cx="570151" cy="169277"/>
+          </a:xfrm>
+          <a:prstGeom prst="rect">
+            <a:avLst/>
+          </a:prstGeom>
+          <a:solidFill>
+            <a:schemeClr val="bg1">
+              <a:lumMod val="85000"/>
+            </a:schemeClr>
+          </a:solidFill>
+        </p:spPr>
+        <p:txBody>
+          <a:bodyPr wrap="square" rtlCol="0">
+            <a:spAutoFit/>
+          </a:bodyPr>
+          <a:lstStyle/>
+          <a:p>
+            <a:pPr algn="ctr"/>
+            <a:r>
+              <a:rPr lang="pt-BR" sz="500" dirty="0"/>
+              <a:t>À Vista</a:t>
+            </a:r>
+          </a:p>
+        </p:txBody>
+      </p:sp>
+      <p:sp>
+        <p:nvSpPr>
+          <p:cNvPr id="20" name="CaixaDeTexto 19">
+            <a:extLst>
+              <a:ext uri="{FF2B5EF4-FFF2-40B4-BE49-F238E27FC236}">
+                <a16:creationId xmlns:a16="http://schemas.microsoft.com/office/drawing/2014/main" id="{9EFC08F9-2CA2-9B4D-AF12-A71DE75D951A}"/>
+              </a:ext>
+            </a:extLst>
+          </p:cNvPr>
+          <p:cNvSpPr txBox="1"/>
+          <p:nvPr/>
+        </p:nvSpPr>
+        <p:spPr>
+          <a:xfrm>
+            <a:off x="6665373" y="889937"/>
+            <a:ext cx="765215" cy="169277"/>
+          </a:xfrm>
+          <a:prstGeom prst="rect">
+            <a:avLst/>
+          </a:prstGeom>
+          <a:solidFill>
+            <a:schemeClr val="bg1">
+              <a:lumMod val="85000"/>
+            </a:schemeClr>
+          </a:solidFill>
+        </p:spPr>
+        <p:txBody>
+          <a:bodyPr wrap="square" rtlCol="0">
+            <a:spAutoFit/>
+          </a:bodyPr>
+          <a:lstStyle/>
+          <a:p>
+            <a:pPr algn="ctr"/>
+            <a:r>
+              <a:rPr lang="pt-BR" sz="500" dirty="0"/>
+              <a:t>Financiamento Padrão</a:t>
+            </a:r>
+          </a:p>
+        </p:txBody>
+      </p:sp>
+      <p:sp>
+        <p:nvSpPr>
+          <p:cNvPr id="21" name="CaixaDeTexto 20">
+            <a:extLst>
+              <a:ext uri="{FF2B5EF4-FFF2-40B4-BE49-F238E27FC236}">
+                <a16:creationId xmlns:a16="http://schemas.microsoft.com/office/drawing/2014/main" id="{EE4D2C7F-2F51-5448-B244-FBCDC411F914}"/>
+              </a:ext>
+            </a:extLst>
+          </p:cNvPr>
+          <p:cNvSpPr txBox="1"/>
+          <p:nvPr/>
+        </p:nvSpPr>
+        <p:spPr>
+          <a:xfrm>
+            <a:off x="4969525" y="889566"/>
+            <a:ext cx="514813" cy="169277"/>
+          </a:xfrm>
+          <a:prstGeom prst="rect">
+            <a:avLst/>
+          </a:prstGeom>
+          <a:solidFill>
+            <a:schemeClr val="bg1">
+              <a:lumMod val="85000"/>
+            </a:schemeClr>
+          </a:solidFill>
+        </p:spPr>
+        <p:txBody>
+          <a:bodyPr wrap="square" rtlCol="0">
+            <a:spAutoFit/>
+          </a:bodyPr>
+          <a:lstStyle/>
+          <a:p>
+            <a:pPr algn="ctr"/>
+            <a:r>
+              <a:rPr lang="pt-BR" sz="500" dirty="0"/>
+              <a:t>Não Compra</a:t>
+            </a:r>
+          </a:p>
+        </p:txBody>
+      </p:sp>
+      <p:sp>
+        <p:nvSpPr>
+          <p:cNvPr id="22" name="CaixaDeTexto 21">
+            <a:extLst>
+              <a:ext uri="{FF2B5EF4-FFF2-40B4-BE49-F238E27FC236}">
+                <a16:creationId xmlns:a16="http://schemas.microsoft.com/office/drawing/2014/main" id="{ADA85241-56AD-6B46-87E0-09498B0B13E4}"/>
+              </a:ext>
+            </a:extLst>
+          </p:cNvPr>
+          <p:cNvSpPr txBox="1"/>
+          <p:nvPr/>
+        </p:nvSpPr>
+        <p:spPr>
+          <a:xfrm>
+            <a:off x="5808752" y="124992"/>
+            <a:ext cx="570151" cy="169277"/>
+          </a:xfrm>
+          <a:prstGeom prst="rect">
+            <a:avLst/>
+          </a:prstGeom>
+          <a:noFill/>
+          <a:ln>
+            <a:noFill/>
+          </a:ln>
+        </p:spPr>
+        <p:txBody>
+          <a:bodyPr wrap="square" rtlCol="0">
+            <a:spAutoFit/>
+          </a:bodyPr>
+          <a:lstStyle/>
+          <a:p>
+            <a:pPr algn="ctr"/>
+            <a:r>
+              <a:rPr lang="pt-BR" sz="500" b="1" dirty="0"/>
+              <a:t>COMPRADOR</a:t>
+            </a:r>
+          </a:p>
+        </p:txBody>
+      </p:sp>
+      <p:sp>
+        <p:nvSpPr>
+          <p:cNvPr id="23" name="CaixaDeTexto 22">
+            <a:extLst>
+              <a:ext uri="{FF2B5EF4-FFF2-40B4-BE49-F238E27FC236}">
+                <a16:creationId xmlns:a16="http://schemas.microsoft.com/office/drawing/2014/main" id="{8DD8A38A-69D9-E24E-A5E2-2E5E33E1CF8F}"/>
+              </a:ext>
+            </a:extLst>
+          </p:cNvPr>
+          <p:cNvSpPr txBox="1"/>
+          <p:nvPr/>
+        </p:nvSpPr>
+        <p:spPr>
+          <a:xfrm>
+            <a:off x="4362047" y="1579686"/>
+            <a:ext cx="570151" cy="246221"/>
+          </a:xfrm>
+          <a:prstGeom prst="rect">
+            <a:avLst/>
+          </a:prstGeom>
+          <a:noFill/>
+          <a:ln>
+            <a:noFill/>
+          </a:ln>
+        </p:spPr>
+        <p:txBody>
+          <a:bodyPr wrap="square" rtlCol="0">
+            <a:spAutoFit/>
+          </a:bodyPr>
+          <a:lstStyle/>
+          <a:p>
+            <a:pPr algn="ctr"/>
+            <a:r>
+              <a:rPr lang="pt-BR" sz="500" b="1" dirty="0"/>
+              <a:t>AGENTE FINANCEIRO</a:t>
+            </a:r>
+          </a:p>
+        </p:txBody>
+      </p:sp>
+      <p:sp>
+        <p:nvSpPr>
+          <p:cNvPr id="24" name="CaixaDeTexto 23">
+            <a:extLst>
+              <a:ext uri="{FF2B5EF4-FFF2-40B4-BE49-F238E27FC236}">
+                <a16:creationId xmlns:a16="http://schemas.microsoft.com/office/drawing/2014/main" id="{B3D94B2A-348E-9F48-AD99-3136221F949B}"/>
+              </a:ext>
+            </a:extLst>
+          </p:cNvPr>
+          <p:cNvSpPr txBox="1"/>
+          <p:nvPr/>
+        </p:nvSpPr>
+        <p:spPr>
+          <a:xfrm>
+            <a:off x="5808751" y="1579686"/>
+            <a:ext cx="570151" cy="246221"/>
+          </a:xfrm>
+          <a:prstGeom prst="rect">
+            <a:avLst/>
+          </a:prstGeom>
+          <a:noFill/>
+          <a:ln>
+            <a:noFill/>
+          </a:ln>
+        </p:spPr>
+        <p:txBody>
+          <a:bodyPr wrap="square" rtlCol="0">
+            <a:spAutoFit/>
+          </a:bodyPr>
+          <a:lstStyle/>
+          <a:p>
+            <a:pPr algn="ctr"/>
+            <a:r>
+              <a:rPr lang="pt-BR" sz="500" b="1" dirty="0"/>
+              <a:t>AGENTE FINANCEIRO</a:t>
+            </a:r>
+          </a:p>
+        </p:txBody>
+      </p:sp>
+      <p:sp>
+        <p:nvSpPr>
+          <p:cNvPr id="25" name="CaixaDeTexto 24">
+            <a:extLst>
+              <a:ext uri="{FF2B5EF4-FFF2-40B4-BE49-F238E27FC236}">
+                <a16:creationId xmlns:a16="http://schemas.microsoft.com/office/drawing/2014/main" id="{C3A2E568-7FB1-7E4F-841A-AC2BDE6081A3}"/>
+              </a:ext>
+            </a:extLst>
+          </p:cNvPr>
+          <p:cNvSpPr txBox="1"/>
+          <p:nvPr/>
+        </p:nvSpPr>
+        <p:spPr>
+          <a:xfrm>
+            <a:off x="7308704" y="1579685"/>
+            <a:ext cx="570151" cy="246221"/>
+          </a:xfrm>
+          <a:prstGeom prst="rect">
+            <a:avLst/>
+          </a:prstGeom>
+          <a:noFill/>
+          <a:ln>
+            <a:noFill/>
+          </a:ln>
+        </p:spPr>
+        <p:txBody>
+          <a:bodyPr wrap="square" rtlCol="0">
+            <a:spAutoFit/>
+          </a:bodyPr>
+          <a:lstStyle/>
+          <a:p>
+            <a:pPr algn="ctr"/>
+            <a:r>
+              <a:rPr lang="pt-BR" sz="500" b="1" dirty="0"/>
+              <a:t>AGENTE FINANCEIRO</a:t>
+            </a:r>
+          </a:p>
+        </p:txBody>
+      </p:sp>
+      <p:sp>
+        <p:nvSpPr>
+          <p:cNvPr id="26" name="CaixaDeTexto 25">
+            <a:extLst>
+              <a:ext uri="{FF2B5EF4-FFF2-40B4-BE49-F238E27FC236}">
+                <a16:creationId xmlns:a16="http://schemas.microsoft.com/office/drawing/2014/main" id="{EBB84142-8A63-2547-B222-79FCB590D2C7}"/>
+              </a:ext>
+            </a:extLst>
+          </p:cNvPr>
+          <p:cNvSpPr txBox="1"/>
+          <p:nvPr/>
+        </p:nvSpPr>
+        <p:spPr>
+          <a:xfrm>
+            <a:off x="4330053" y="1760638"/>
+            <a:ext cx="570151" cy="246221"/>
+          </a:xfrm>
+          <a:prstGeom prst="rect">
+            <a:avLst/>
+          </a:prstGeom>
+          <a:noFill/>
+          <a:ln>
+            <a:noFill/>
+          </a:ln>
+        </p:spPr>
+        <p:txBody>
+          <a:bodyPr wrap="square" rtlCol="0">
+            <a:spAutoFit/>
+          </a:bodyPr>
+          <a:lstStyle/>
+          <a:p>
+            <a:pPr algn="ctr"/>
+            <a:r>
+              <a:rPr lang="pt-BR" sz="1000" b="1" dirty="0"/>
+              <a:t>(0, 0)</a:t>
+            </a:r>
+          </a:p>
+        </p:txBody>
+      </p:sp>
+      <p:cxnSp>
+        <p:nvCxnSpPr>
+          <p:cNvPr id="27" name="Conector Reto 26">
+            <a:extLst>
+              <a:ext uri="{FF2B5EF4-FFF2-40B4-BE49-F238E27FC236}">
+                <a16:creationId xmlns:a16="http://schemas.microsoft.com/office/drawing/2014/main" id="{F2CE2E40-0507-044C-9AB3-67A6D6A88607}"/>
+              </a:ext>
+            </a:extLst>
+          </p:cNvPr>
+          <p:cNvCxnSpPr>
+            <a:stCxn id="24" idx="2"/>
+          </p:cNvCxnSpPr>
+          <p:nvPr/>
+        </p:nvCxnSpPr>
+        <p:spPr>
+          <a:xfrm flipH="1">
+            <a:off x="5808751" y="1825907"/>
+            <a:ext cx="285076" cy="400706"/>
+          </a:xfrm>
+          <a:prstGeom prst="line">
+            <a:avLst/>
+          </a:prstGeom>
+        </p:spPr>
+        <p:style>
+          <a:lnRef idx="1">
+            <a:schemeClr val="dk1"/>
+          </a:lnRef>
+          <a:fillRef idx="0">
+            <a:schemeClr val="dk1"/>
+          </a:fillRef>
+          <a:effectRef idx="0">
+            <a:schemeClr val="dk1"/>
+          </a:effectRef>
+          <a:fontRef idx="minor">
+            <a:schemeClr val="tx1"/>
+          </a:fontRef>
+        </p:style>
+      </p:cxnSp>
+      <p:cxnSp>
+        <p:nvCxnSpPr>
+          <p:cNvPr id="30" name="Conector Reto 29">
+            <a:extLst>
+              <a:ext uri="{FF2B5EF4-FFF2-40B4-BE49-F238E27FC236}">
+                <a16:creationId xmlns:a16="http://schemas.microsoft.com/office/drawing/2014/main" id="{52EEC96F-FA39-4D49-9608-5FB3B81ABE30}"/>
+              </a:ext>
+            </a:extLst>
+          </p:cNvPr>
+          <p:cNvCxnSpPr>
+            <a:stCxn id="24" idx="2"/>
+          </p:cNvCxnSpPr>
+          <p:nvPr/>
+        </p:nvCxnSpPr>
+        <p:spPr>
+          <a:xfrm>
+            <a:off x="6093827" y="1825907"/>
+            <a:ext cx="285075" cy="400706"/>
+          </a:xfrm>
+          <a:prstGeom prst="line">
+            <a:avLst/>
+          </a:prstGeom>
+        </p:spPr>
+        <p:style>
+          <a:lnRef idx="1">
+            <a:schemeClr val="dk1"/>
+          </a:lnRef>
+          <a:fillRef idx="0">
+            <a:schemeClr val="dk1"/>
+          </a:fillRef>
+          <a:effectRef idx="0">
+            <a:schemeClr val="dk1"/>
+          </a:effectRef>
+          <a:fontRef idx="minor">
+            <a:schemeClr val="tx1"/>
+          </a:fontRef>
+        </p:style>
+      </p:cxnSp>
+      <p:sp>
+        <p:nvSpPr>
+          <p:cNvPr id="34" name="CaixaDeTexto 33">
+            <a:extLst>
+              <a:ext uri="{FF2B5EF4-FFF2-40B4-BE49-F238E27FC236}">
+                <a16:creationId xmlns:a16="http://schemas.microsoft.com/office/drawing/2014/main" id="{5580F55C-1593-0046-8998-7CEF1C4657CE}"/>
+              </a:ext>
+            </a:extLst>
+          </p:cNvPr>
+          <p:cNvSpPr txBox="1"/>
+          <p:nvPr/>
+        </p:nvSpPr>
+        <p:spPr>
+          <a:xfrm>
+            <a:off x="5575465" y="1963047"/>
+            <a:ext cx="375824" cy="169277"/>
+          </a:xfrm>
+          <a:prstGeom prst="rect">
+            <a:avLst/>
+          </a:prstGeom>
+          <a:solidFill>
+            <a:schemeClr val="bg1">
+              <a:lumMod val="85000"/>
+            </a:schemeClr>
+          </a:solidFill>
+        </p:spPr>
+        <p:txBody>
+          <a:bodyPr wrap="square" rtlCol="0">
+            <a:spAutoFit/>
+          </a:bodyPr>
+          <a:lstStyle/>
+          <a:p>
+            <a:pPr algn="ctr"/>
+            <a:r>
+              <a:rPr lang="pt-BR" sz="500" dirty="0"/>
+              <a:t>Aceita</a:t>
+            </a:r>
+          </a:p>
+        </p:txBody>
+      </p:sp>
+      <p:sp>
+        <p:nvSpPr>
+          <p:cNvPr id="35" name="CaixaDeTexto 34">
+            <a:extLst>
+              <a:ext uri="{FF2B5EF4-FFF2-40B4-BE49-F238E27FC236}">
+                <a16:creationId xmlns:a16="http://schemas.microsoft.com/office/drawing/2014/main" id="{E4655279-C67D-1145-8321-87FEAA36043C}"/>
+              </a:ext>
+            </a:extLst>
+          </p:cNvPr>
+          <p:cNvSpPr txBox="1"/>
+          <p:nvPr/>
+        </p:nvSpPr>
+        <p:spPr>
+          <a:xfrm>
+            <a:off x="6244154" y="1962930"/>
+            <a:ext cx="375824" cy="169277"/>
+          </a:xfrm>
+          <a:prstGeom prst="rect">
+            <a:avLst/>
+          </a:prstGeom>
+          <a:solidFill>
+            <a:schemeClr val="accent2">
+              <a:lumMod val="60000"/>
+              <a:lumOff val="40000"/>
+            </a:schemeClr>
+          </a:solidFill>
+        </p:spPr>
+        <p:txBody>
+          <a:bodyPr wrap="square" rtlCol="0">
+            <a:spAutoFit/>
+          </a:bodyPr>
+          <a:lstStyle/>
+          <a:p>
+            <a:pPr algn="ctr"/>
+            <a:r>
+              <a:rPr lang="pt-BR" sz="500" dirty="0"/>
+              <a:t>Rejeita</a:t>
+            </a:r>
+          </a:p>
+        </p:txBody>
+      </p:sp>
+      <p:sp>
+        <p:nvSpPr>
+          <p:cNvPr id="36" name="CaixaDeTexto 35">
+            <a:extLst>
+              <a:ext uri="{FF2B5EF4-FFF2-40B4-BE49-F238E27FC236}">
+                <a16:creationId xmlns:a16="http://schemas.microsoft.com/office/drawing/2014/main" id="{3DB3215F-5FDC-CF49-99D7-4C0D82344970}"/>
+              </a:ext>
+            </a:extLst>
+          </p:cNvPr>
+          <p:cNvSpPr txBox="1"/>
+          <p:nvPr/>
+        </p:nvSpPr>
+        <p:spPr>
+          <a:xfrm>
+            <a:off x="5362562" y="2196666"/>
+            <a:ext cx="702066" cy="246221"/>
+          </a:xfrm>
+          <a:prstGeom prst="rect">
+            <a:avLst/>
+          </a:prstGeom>
+          <a:noFill/>
+          <a:ln>
+            <a:noFill/>
+          </a:ln>
+        </p:spPr>
+        <p:txBody>
+          <a:bodyPr wrap="square" rtlCol="0">
+            <a:spAutoFit/>
+          </a:bodyPr>
+          <a:lstStyle/>
+          <a:p>
+            <a:pPr algn="ctr"/>
+            <a:r>
+              <a:rPr lang="pt-BR" sz="1000" b="1" dirty="0"/>
+              <a:t>(V-P, P)</a:t>
+            </a:r>
+          </a:p>
+        </p:txBody>
+      </p:sp>
+      <p:sp>
+        <p:nvSpPr>
+          <p:cNvPr id="37" name="CaixaDeTexto 36">
+            <a:extLst>
+              <a:ext uri="{FF2B5EF4-FFF2-40B4-BE49-F238E27FC236}">
+                <a16:creationId xmlns:a16="http://schemas.microsoft.com/office/drawing/2014/main" id="{EF4B825C-7B81-0E43-9B9A-2867F26C2468}"/>
+              </a:ext>
+            </a:extLst>
+          </p:cNvPr>
+          <p:cNvSpPr txBox="1"/>
+          <p:nvPr/>
+        </p:nvSpPr>
+        <p:spPr>
+          <a:xfrm>
+            <a:off x="6093827" y="2194359"/>
+            <a:ext cx="570151" cy="246221"/>
+          </a:xfrm>
+          <a:prstGeom prst="rect">
+            <a:avLst/>
+          </a:prstGeom>
+          <a:noFill/>
+          <a:ln>
+            <a:noFill/>
+          </a:ln>
+        </p:spPr>
+        <p:txBody>
+          <a:bodyPr wrap="square" rtlCol="0">
+            <a:spAutoFit/>
+          </a:bodyPr>
+          <a:lstStyle/>
+          <a:p>
+            <a:pPr algn="ctr"/>
+            <a:r>
+              <a:rPr lang="pt-BR" sz="1000" b="1" dirty="0"/>
+              <a:t>(0, 0)</a:t>
+            </a:r>
+          </a:p>
+        </p:txBody>
+      </p:sp>
+      <p:cxnSp>
+        <p:nvCxnSpPr>
+          <p:cNvPr id="38" name="Conector Reto 37">
+            <a:extLst>
+              <a:ext uri="{FF2B5EF4-FFF2-40B4-BE49-F238E27FC236}">
+                <a16:creationId xmlns:a16="http://schemas.microsoft.com/office/drawing/2014/main" id="{A2CD662C-6AC1-264C-8653-9191335075F0}"/>
+              </a:ext>
+            </a:extLst>
+          </p:cNvPr>
+          <p:cNvCxnSpPr>
+            <a:stCxn id="25" idx="2"/>
+            <a:endCxn id="48" idx="0"/>
+          </p:cNvCxnSpPr>
+          <p:nvPr/>
+        </p:nvCxnSpPr>
+        <p:spPr>
+          <a:xfrm flipH="1">
+            <a:off x="7344947" y="1825906"/>
+            <a:ext cx="248833" cy="400707"/>
+          </a:xfrm>
+          <a:prstGeom prst="line">
+            <a:avLst/>
+          </a:prstGeom>
+        </p:spPr>
+        <p:style>
+          <a:lnRef idx="1">
+            <a:schemeClr val="dk1"/>
+          </a:lnRef>
+          <a:fillRef idx="0">
+            <a:schemeClr val="dk1"/>
+          </a:fillRef>
+          <a:effectRef idx="0">
+            <a:schemeClr val="dk1"/>
+          </a:effectRef>
+          <a:fontRef idx="minor">
+            <a:schemeClr val="tx1"/>
+          </a:fontRef>
+        </p:style>
+      </p:cxnSp>
+      <p:cxnSp>
+        <p:nvCxnSpPr>
+          <p:cNvPr id="39" name="Conector Reto 38">
+            <a:extLst>
+              <a:ext uri="{FF2B5EF4-FFF2-40B4-BE49-F238E27FC236}">
+                <a16:creationId xmlns:a16="http://schemas.microsoft.com/office/drawing/2014/main" id="{E4E8A8AD-5857-A045-85AD-E1413F7701DD}"/>
+              </a:ext>
+            </a:extLst>
+          </p:cNvPr>
+          <p:cNvCxnSpPr/>
+          <p:nvPr/>
+        </p:nvCxnSpPr>
+        <p:spPr>
+          <a:xfrm>
+            <a:off x="7600014" y="1825907"/>
+            <a:ext cx="285075" cy="400706"/>
+          </a:xfrm>
+          <a:prstGeom prst="line">
+            <a:avLst/>
+          </a:prstGeom>
+        </p:spPr>
+        <p:style>
+          <a:lnRef idx="1">
+            <a:schemeClr val="dk1"/>
+          </a:lnRef>
+          <a:fillRef idx="0">
+            <a:schemeClr val="dk1"/>
+          </a:fillRef>
+          <a:effectRef idx="0">
+            <a:schemeClr val="dk1"/>
+          </a:effectRef>
+          <a:fontRef idx="minor">
+            <a:schemeClr val="tx1"/>
+          </a:fontRef>
+        </p:style>
+      </p:cxnSp>
+      <p:sp>
+        <p:nvSpPr>
+          <p:cNvPr id="40" name="CaixaDeTexto 39">
+            <a:extLst>
+              <a:ext uri="{FF2B5EF4-FFF2-40B4-BE49-F238E27FC236}">
+                <a16:creationId xmlns:a16="http://schemas.microsoft.com/office/drawing/2014/main" id="{87800389-B6A9-1742-B3A2-8D2D5FEF6AE1}"/>
+              </a:ext>
+            </a:extLst>
+          </p:cNvPr>
+          <p:cNvSpPr txBox="1"/>
+          <p:nvPr/>
+        </p:nvSpPr>
+        <p:spPr>
+          <a:xfrm>
+            <a:off x="7081652" y="1963047"/>
+            <a:ext cx="375824" cy="169277"/>
+          </a:xfrm>
+          <a:prstGeom prst="rect">
+            <a:avLst/>
+          </a:prstGeom>
+          <a:solidFill>
+            <a:schemeClr val="bg1">
+              <a:lumMod val="85000"/>
+            </a:schemeClr>
+          </a:solidFill>
+        </p:spPr>
+        <p:txBody>
+          <a:bodyPr wrap="square" rtlCol="0">
+            <a:spAutoFit/>
+          </a:bodyPr>
+          <a:lstStyle/>
+          <a:p>
+            <a:pPr algn="ctr"/>
+            <a:r>
+              <a:rPr lang="pt-BR" sz="500" dirty="0"/>
+              <a:t>Aceita</a:t>
+            </a:r>
+          </a:p>
+        </p:txBody>
+      </p:sp>
+      <p:sp>
+        <p:nvSpPr>
+          <p:cNvPr id="41" name="CaixaDeTexto 40">
+            <a:extLst>
+              <a:ext uri="{FF2B5EF4-FFF2-40B4-BE49-F238E27FC236}">
+                <a16:creationId xmlns:a16="http://schemas.microsoft.com/office/drawing/2014/main" id="{46F34E6C-0FF9-A547-A46C-5C9CE70FED77}"/>
+              </a:ext>
+            </a:extLst>
+          </p:cNvPr>
+          <p:cNvSpPr txBox="1"/>
+          <p:nvPr/>
+        </p:nvSpPr>
+        <p:spPr>
+          <a:xfrm>
+            <a:off x="7750341" y="1962930"/>
+            <a:ext cx="375824" cy="169277"/>
+          </a:xfrm>
+          <a:prstGeom prst="rect">
+            <a:avLst/>
+          </a:prstGeom>
+          <a:solidFill>
+            <a:schemeClr val="accent2">
+              <a:lumMod val="60000"/>
+              <a:lumOff val="40000"/>
+            </a:schemeClr>
+          </a:solidFill>
+        </p:spPr>
+        <p:txBody>
+          <a:bodyPr wrap="square" rtlCol="0">
+            <a:spAutoFit/>
+          </a:bodyPr>
+          <a:lstStyle/>
+          <a:p>
+            <a:pPr algn="ctr"/>
+            <a:r>
+              <a:rPr lang="pt-BR" sz="500" dirty="0"/>
+              <a:t>Rejeita</a:t>
+            </a:r>
+          </a:p>
+        </p:txBody>
+      </p:sp>
+      <p:sp>
+        <p:nvSpPr>
+          <p:cNvPr id="43" name="CaixaDeTexto 42">
+            <a:extLst>
+              <a:ext uri="{FF2B5EF4-FFF2-40B4-BE49-F238E27FC236}">
+                <a16:creationId xmlns:a16="http://schemas.microsoft.com/office/drawing/2014/main" id="{7045AAA0-A7E7-764A-98D6-99BCE51C6864}"/>
+              </a:ext>
+            </a:extLst>
+          </p:cNvPr>
+          <p:cNvSpPr txBox="1"/>
+          <p:nvPr/>
+        </p:nvSpPr>
+        <p:spPr>
+          <a:xfrm>
+            <a:off x="7600014" y="2194359"/>
+            <a:ext cx="570151" cy="246221"/>
+          </a:xfrm>
+          <a:prstGeom prst="rect">
+            <a:avLst/>
+          </a:prstGeom>
+          <a:noFill/>
+          <a:ln>
+            <a:noFill/>
+          </a:ln>
+        </p:spPr>
+        <p:txBody>
+          <a:bodyPr wrap="square" rtlCol="0">
+            <a:spAutoFit/>
+          </a:bodyPr>
+          <a:lstStyle/>
+          <a:p>
+            <a:pPr algn="ctr"/>
+            <a:r>
+              <a:rPr lang="pt-BR" sz="1000" b="1" dirty="0"/>
+              <a:t>(0, 0)</a:t>
+            </a:r>
+          </a:p>
+        </p:txBody>
+      </p:sp>
+      <p:pic>
+        <p:nvPicPr>
+          <p:cNvPr id="48" name="Gráfico 47" descr="Homem">
+            <a:extLst>
+              <a:ext uri="{FF2B5EF4-FFF2-40B4-BE49-F238E27FC236}">
+                <a16:creationId xmlns:a16="http://schemas.microsoft.com/office/drawing/2014/main" id="{79CBF1F2-44F6-AB4D-988E-59F1F8694E98}"/>
+              </a:ext>
+            </a:extLst>
+          </p:cNvPr>
+          <p:cNvPicPr>
+            <a:picLocks noChangeAspect="1"/>
+          </p:cNvPicPr>
+          <p:nvPr/>
+        </p:nvPicPr>
+        <p:blipFill>
+          <a:blip r:embed="rId3">
+            <a:extLst>
+              <a:ext uri="{96DAC541-7B7A-43D3-8B79-37D633B846F1}">
+                <asvg:svgBlip xmlns:asvg="http://schemas.microsoft.com/office/drawing/2016/SVG/main" r:embed="rId4"/>
+              </a:ext>
+            </a:extLst>
+          </a:blip>
+          <a:stretch>
+            <a:fillRect/>
+          </a:stretch>
+        </p:blipFill>
+        <p:spPr>
+          <a:xfrm>
+            <a:off x="7110168" y="2226613"/>
+            <a:ext cx="469557" cy="469557"/>
+          </a:xfrm>
+          <a:prstGeom prst="rect">
+            <a:avLst/>
+          </a:prstGeom>
+        </p:spPr>
+      </p:pic>
+      <p:cxnSp>
+        <p:nvCxnSpPr>
+          <p:cNvPr id="50" name="Conector Reto 49">
+            <a:extLst>
+              <a:ext uri="{FF2B5EF4-FFF2-40B4-BE49-F238E27FC236}">
+                <a16:creationId xmlns:a16="http://schemas.microsoft.com/office/drawing/2014/main" id="{1E9A827E-8219-FF4A-8BB1-20774F51C8C1}"/>
+              </a:ext>
+            </a:extLst>
+          </p:cNvPr>
+          <p:cNvCxnSpPr/>
+          <p:nvPr/>
+        </p:nvCxnSpPr>
+        <p:spPr>
+          <a:xfrm flipH="1">
+            <a:off x="7029948" y="2794836"/>
+            <a:ext cx="292705" cy="486735"/>
+          </a:xfrm>
+          <a:prstGeom prst="line">
+            <a:avLst/>
+          </a:prstGeom>
+        </p:spPr>
+        <p:style>
+          <a:lnRef idx="1">
+            <a:schemeClr val="dk1"/>
+          </a:lnRef>
+          <a:fillRef idx="0">
+            <a:schemeClr val="dk1"/>
+          </a:fillRef>
+          <a:effectRef idx="0">
+            <a:schemeClr val="dk1"/>
+          </a:effectRef>
+          <a:fontRef idx="minor">
+            <a:schemeClr val="tx1"/>
+          </a:fontRef>
+        </p:style>
+      </p:cxnSp>
+      <p:cxnSp>
+        <p:nvCxnSpPr>
+          <p:cNvPr id="53" name="Conector Reto 52">
+            <a:extLst>
+              <a:ext uri="{FF2B5EF4-FFF2-40B4-BE49-F238E27FC236}">
+                <a16:creationId xmlns:a16="http://schemas.microsoft.com/office/drawing/2014/main" id="{CF83581A-7BA9-C24C-B5A1-356484276FC5}"/>
+              </a:ext>
+            </a:extLst>
+          </p:cNvPr>
+          <p:cNvCxnSpPr/>
+          <p:nvPr/>
+        </p:nvCxnSpPr>
+        <p:spPr>
+          <a:xfrm>
+            <a:off x="7322653" y="2794836"/>
+            <a:ext cx="286469" cy="486735"/>
+          </a:xfrm>
+          <a:prstGeom prst="line">
+            <a:avLst/>
+          </a:prstGeom>
+        </p:spPr>
+        <p:style>
+          <a:lnRef idx="1">
+            <a:schemeClr val="dk1"/>
+          </a:lnRef>
+          <a:fillRef idx="0">
+            <a:schemeClr val="dk1"/>
+          </a:fillRef>
+          <a:effectRef idx="0">
+            <a:schemeClr val="dk1"/>
+          </a:effectRef>
+          <a:fontRef idx="minor">
+            <a:schemeClr val="tx1"/>
+          </a:fontRef>
+        </p:style>
+      </p:cxnSp>
+      <p:sp>
+        <p:nvSpPr>
+          <p:cNvPr id="58" name="CaixaDeTexto 57">
+            <a:extLst>
+              <a:ext uri="{FF2B5EF4-FFF2-40B4-BE49-F238E27FC236}">
+                <a16:creationId xmlns:a16="http://schemas.microsoft.com/office/drawing/2014/main" id="{D16E121C-5CD8-A543-90F6-CB49BFEC7AA2}"/>
+              </a:ext>
+            </a:extLst>
+          </p:cNvPr>
+          <p:cNvSpPr txBox="1"/>
+          <p:nvPr/>
+        </p:nvSpPr>
+        <p:spPr>
+          <a:xfrm>
+            <a:off x="6820738" y="3304392"/>
+            <a:ext cx="409895" cy="169277"/>
+          </a:xfrm>
+          <a:prstGeom prst="rect">
+            <a:avLst/>
+          </a:prstGeom>
+          <a:solidFill>
+            <a:schemeClr val="bg1">
+              <a:lumMod val="85000"/>
+            </a:schemeClr>
+          </a:solidFill>
+        </p:spPr>
+        <p:txBody>
+          <a:bodyPr wrap="square" rtlCol="0">
+            <a:spAutoFit/>
+          </a:bodyPr>
+          <a:lstStyle/>
+          <a:p>
+            <a:pPr algn="ctr"/>
+            <a:r>
+              <a:rPr lang="pt-BR" sz="500" dirty="0"/>
+              <a:t>Cumpre</a:t>
+            </a:r>
+          </a:p>
+        </p:txBody>
+      </p:sp>
+      <p:sp>
+        <p:nvSpPr>
+          <p:cNvPr id="59" name="CaixaDeTexto 58">
+            <a:extLst>
+              <a:ext uri="{FF2B5EF4-FFF2-40B4-BE49-F238E27FC236}">
+                <a16:creationId xmlns:a16="http://schemas.microsoft.com/office/drawing/2014/main" id="{C90C265C-F5C8-5241-A9AC-BED6EF262404}"/>
+              </a:ext>
+            </a:extLst>
+          </p:cNvPr>
+          <p:cNvSpPr txBox="1"/>
+          <p:nvPr/>
+        </p:nvSpPr>
+        <p:spPr>
+          <a:xfrm>
+            <a:off x="6644845" y="3497337"/>
+            <a:ext cx="761679" cy="246221"/>
+          </a:xfrm>
+          <a:prstGeom prst="rect">
+            <a:avLst/>
+          </a:prstGeom>
+          <a:noFill/>
+          <a:ln>
+            <a:noFill/>
+          </a:ln>
+        </p:spPr>
+        <p:txBody>
+          <a:bodyPr wrap="square" rtlCol="0">
+            <a:spAutoFit/>
+          </a:bodyPr>
+          <a:lstStyle/>
+          <a:p>
+            <a:pPr algn="ctr"/>
+            <a:r>
+              <a:rPr lang="pt-BR" sz="1000" b="1" dirty="0"/>
+              <a:t>(V-P*, </a:t>
+            </a:r>
+            <a:r>
+              <a:rPr lang="pt-BR" sz="1000" b="1" dirty="0" err="1"/>
+              <a:t>P</a:t>
+            </a:r>
+            <a:r>
+              <a:rPr lang="pt-BR" sz="1000" b="1" dirty="0"/>
+              <a:t>*)</a:t>
+            </a:r>
+          </a:p>
+        </p:txBody>
+      </p:sp>
+      <p:sp>
+        <p:nvSpPr>
+          <p:cNvPr id="60" name="CaixaDeTexto 59">
+            <a:extLst>
+              <a:ext uri="{FF2B5EF4-FFF2-40B4-BE49-F238E27FC236}">
+                <a16:creationId xmlns:a16="http://schemas.microsoft.com/office/drawing/2014/main" id="{FE621D25-530E-3C4B-B1E1-EA06E86A9659}"/>
+              </a:ext>
+            </a:extLst>
+          </p:cNvPr>
+          <p:cNvSpPr txBox="1"/>
+          <p:nvPr/>
+        </p:nvSpPr>
+        <p:spPr>
+          <a:xfrm>
+            <a:off x="7383643" y="3306155"/>
+            <a:ext cx="490022" cy="169277"/>
+          </a:xfrm>
+          <a:prstGeom prst="rect">
+            <a:avLst/>
+          </a:prstGeom>
+          <a:solidFill>
+            <a:schemeClr val="accent1">
+              <a:lumMod val="60000"/>
+              <a:lumOff val="40000"/>
+            </a:schemeClr>
+          </a:solidFill>
+        </p:spPr>
+        <p:txBody>
+          <a:bodyPr wrap="square" rtlCol="0">
+            <a:spAutoFit/>
+          </a:bodyPr>
+          <a:lstStyle/>
+          <a:p>
+            <a:pPr algn="ctr"/>
+            <a:r>
+              <a:rPr lang="pt-BR" sz="500" b="1" dirty="0"/>
+              <a:t>Descumpre</a:t>
+            </a:r>
+          </a:p>
+        </p:txBody>
+      </p:sp>
+      <p:sp>
+        <p:nvSpPr>
+          <p:cNvPr id="61" name="CaixaDeTexto 60">
+            <a:extLst>
+              <a:ext uri="{FF2B5EF4-FFF2-40B4-BE49-F238E27FC236}">
+                <a16:creationId xmlns:a16="http://schemas.microsoft.com/office/drawing/2014/main" id="{9522F430-FCB4-1B4C-B228-871D38F884C2}"/>
+              </a:ext>
+            </a:extLst>
+          </p:cNvPr>
+          <p:cNvSpPr txBox="1"/>
+          <p:nvPr/>
+        </p:nvSpPr>
+        <p:spPr>
+          <a:xfrm>
+            <a:off x="7343579" y="3497338"/>
+            <a:ext cx="570151" cy="246221"/>
+          </a:xfrm>
+          <a:prstGeom prst="rect">
+            <a:avLst/>
+          </a:prstGeom>
+          <a:noFill/>
+          <a:ln>
+            <a:noFill/>
+          </a:ln>
+        </p:spPr>
+        <p:txBody>
+          <a:bodyPr wrap="square" rtlCol="0">
+            <a:spAutoFit/>
+          </a:bodyPr>
+          <a:lstStyle/>
+          <a:p>
+            <a:pPr algn="ctr"/>
+            <a:r>
+              <a:rPr lang="pt-BR" sz="1000" b="1" dirty="0"/>
+              <a:t>(C, </a:t>
+            </a:r>
+            <a:r>
+              <a:rPr lang="pt-BR" sz="1000" b="1" dirty="0" err="1"/>
+              <a:t>P</a:t>
+            </a:r>
+            <a:r>
+              <a:rPr lang="pt-BR" sz="1000" b="1" dirty="0"/>
+              <a:t>’)</a:t>
+            </a:r>
+          </a:p>
+        </p:txBody>
+      </p:sp>
+      <p:sp>
+        <p:nvSpPr>
+          <p:cNvPr id="63" name="Balão Retangular 62">
+            <a:extLst>
+              <a:ext uri="{FF2B5EF4-FFF2-40B4-BE49-F238E27FC236}">
+                <a16:creationId xmlns:a16="http://schemas.microsoft.com/office/drawing/2014/main" id="{FF5C97FA-F778-DB41-87E0-612F94A6D3EE}"/>
+              </a:ext>
+            </a:extLst>
+          </p:cNvPr>
+          <p:cNvSpPr/>
+          <p:nvPr/>
+        </p:nvSpPr>
+        <p:spPr>
+          <a:xfrm>
+            <a:off x="8066740" y="3222762"/>
+            <a:ext cx="1324396" cy="486735"/>
+          </a:xfrm>
+          <a:prstGeom prst="wedgeRectCallout">
+            <a:avLst>
+              <a:gd name="adj1" fmla="val -58115"/>
+              <a:gd name="adj2" fmla="val -14251"/>
+            </a:avLst>
+          </a:prstGeom>
+        </p:spPr>
+        <p:style>
+          <a:lnRef idx="2">
+            <a:schemeClr val="accent2">
+              <a:shade val="50000"/>
+            </a:schemeClr>
+          </a:lnRef>
+          <a:fillRef idx="1">
+            <a:schemeClr val="accent2"/>
+          </a:fillRef>
+          <a:effectRef idx="0">
+            <a:schemeClr val="accent2"/>
+          </a:effectRef>
+          <a:fontRef idx="minor">
+            <a:schemeClr val="lt1"/>
+          </a:fontRef>
+        </p:style>
+        <p:txBody>
+          <a:bodyPr rtlCol="0" anchor="ctr"/>
+          <a:lstStyle/>
+          <a:p>
+            <a:pPr algn="ctr"/>
+            <a:r>
+              <a:rPr lang="pt-BR" sz="1200" dirty="0"/>
+              <a:t>Equilíbrio de Nash</a:t>
+            </a:r>
+          </a:p>
+          <a:p>
+            <a:pPr algn="ctr"/>
+            <a:r>
+              <a:rPr lang="pt-BR" sz="800" dirty="0" err="1"/>
+              <a:t>Subótimo</a:t>
+            </a:r>
+            <a:r>
+              <a:rPr lang="pt-BR" sz="800" dirty="0"/>
+              <a:t> para o banco</a:t>
+            </a:r>
+          </a:p>
+        </p:txBody>
+      </p:sp>
+      <p:sp>
+        <p:nvSpPr>
+          <p:cNvPr id="64" name="CaixaDeTexto 63">
+            <a:extLst>
+              <a:ext uri="{FF2B5EF4-FFF2-40B4-BE49-F238E27FC236}">
+                <a16:creationId xmlns:a16="http://schemas.microsoft.com/office/drawing/2014/main" id="{A5C3DFDF-2449-2E49-9183-A85F25A4FEE9}"/>
+              </a:ext>
+            </a:extLst>
+          </p:cNvPr>
+          <p:cNvSpPr txBox="1"/>
+          <p:nvPr/>
+        </p:nvSpPr>
+        <p:spPr>
+          <a:xfrm>
+            <a:off x="7046511" y="2665711"/>
+            <a:ext cx="570151" cy="169277"/>
+          </a:xfrm>
+          <a:prstGeom prst="rect">
+            <a:avLst/>
+          </a:prstGeom>
+          <a:noFill/>
+          <a:ln>
+            <a:noFill/>
+          </a:ln>
+        </p:spPr>
+        <p:txBody>
+          <a:bodyPr wrap="square" rtlCol="0">
+            <a:spAutoFit/>
+          </a:bodyPr>
+          <a:lstStyle/>
+          <a:p>
+            <a:pPr algn="ctr"/>
+            <a:r>
+              <a:rPr lang="pt-BR" sz="500" b="1" dirty="0"/>
+              <a:t>COMPRADOR</a:t>
+            </a:r>
+          </a:p>
+        </p:txBody>
+      </p:sp>
+    </p:spTree>
+    <p:extLst>
+      <p:ext uri="{BB962C8B-B14F-4D97-AF65-F5344CB8AC3E}">
+        <p14:creationId xmlns:p14="http://schemas.microsoft.com/office/powerpoint/2010/main" val="101162556"/>
       </p:ext>
     </p:extLst>
   </p:cSld>
@@ -4824,4 +9302,299 @@
     </a:ext>
   </a:extLst>
 </a:theme>
+</file>
+
+<file path=ppt/theme/theme2.xml><?xml version="1.0" encoding="utf-8"?>
+<a:theme xmlns:a="http://schemas.openxmlformats.org/drawingml/2006/main" name="Tema do Office">
+  <a:themeElements>
+    <a:clrScheme name="Office">
+      <a:dk1>
+        <a:sysClr val="windowText" lastClr="000000"/>
+      </a:dk1>
+      <a:lt1>
+        <a:sysClr val="window" lastClr="FFFFFF"/>
+      </a:lt1>
+      <a:dk2>
+        <a:srgbClr val="44546A"/>
+      </a:dk2>
+      <a:lt2>
+        <a:srgbClr val="E7E6E6"/>
+      </a:lt2>
+      <a:accent1>
+        <a:srgbClr val="4472C4"/>
+      </a:accent1>
+      <a:accent2>
+        <a:srgbClr val="ED7D31"/>
+      </a:accent2>
+      <a:accent3>
+        <a:srgbClr val="A5A5A5"/>
+      </a:accent3>
+      <a:accent4>
+        <a:srgbClr val="FFC000"/>
+      </a:accent4>
+      <a:accent5>
+        <a:srgbClr val="5B9BD5"/>
+      </a:accent5>
+      <a:accent6>
+        <a:srgbClr val="70AD47"/>
+      </a:accent6>
+      <a:hlink>
+        <a:srgbClr val="0563C1"/>
+      </a:hlink>
+      <a:folHlink>
+        <a:srgbClr val="954F72"/>
+      </a:folHlink>
+    </a:clrScheme>
+    <a:fontScheme name="Office">
+      <a:majorFont>
+        <a:latin typeface="Calibri Light" panose="020F0302020204030204"/>
+        <a:ea typeface=""/>
+        <a:cs typeface=""/>
+        <a:font script="Jpan" typeface="游ゴシック Light"/>
+        <a:font script="Hang" typeface="맑은 고딕"/>
+        <a:font script="Hans" typeface="等线 Light"/>
+        <a:font script="Hant" typeface="新細明體"/>
+        <a:font script="Arab" typeface="Times New Roman"/>
+        <a:font script="Hebr" typeface="Times New Roman"/>
+        <a:font script="Thai" typeface="Angsana New"/>
+        <a:font script="Ethi" typeface="Nyala"/>
+        <a:font script="Beng" typeface="Vrinda"/>
+        <a:font script="Gujr" typeface="Shruti"/>
+        <a:font script="Khmr" typeface="MoolBoran"/>
+        <a:font script="Knda" typeface="Tunga"/>
+        <a:font script="Guru" typeface="Raavi"/>
+        <a:font script="Cans" typeface="Euphemia"/>
+        <a:font script="Cher" typeface="Plantagenet Cherokee"/>
+        <a:font script="Yiii" typeface="Microsoft Yi Baiti"/>
+        <a:font script="Tibt" typeface="Microsoft Himalaya"/>
+        <a:font script="Thaa" typeface="MV Boli"/>
+        <a:font script="Deva" typeface="Mangal"/>
+        <a:font script="Telu" typeface="Gautami"/>
+        <a:font script="Taml" typeface="Latha"/>
+        <a:font script="Syrc" typeface="Estrangelo Edessa"/>
+        <a:font script="Orya" typeface="Kalinga"/>
+        <a:font script="Mlym" typeface="Kartika"/>
+        <a:font script="Laoo" typeface="DokChampa"/>
+        <a:font script="Sinh" typeface="Iskoola Pota"/>
+        <a:font script="Mong" typeface="Mongolian Baiti"/>
+        <a:font script="Viet" typeface="Times New Roman"/>
+        <a:font script="Uigh" typeface="Microsoft Uighur"/>
+        <a:font script="Geor" typeface="Sylfaen"/>
+        <a:font script="Armn" typeface="Arial"/>
+        <a:font script="Bugi" typeface="Leelawadee UI"/>
+        <a:font script="Bopo" typeface="Microsoft JhengHei"/>
+        <a:font script="Java" typeface="Javanese Text"/>
+        <a:font script="Lisu" typeface="Segoe UI"/>
+        <a:font script="Mymr" typeface="Myanmar Text"/>
+        <a:font script="Nkoo" typeface="Ebrima"/>
+        <a:font script="Olck" typeface="Nirmala UI"/>
+        <a:font script="Osma" typeface="Ebrima"/>
+        <a:font script="Phag" typeface="Phagspa"/>
+        <a:font script="Syrn" typeface="Estrangelo Edessa"/>
+        <a:font script="Syrj" typeface="Estrangelo Edessa"/>
+        <a:font script="Syre" typeface="Estrangelo Edessa"/>
+        <a:font script="Sora" typeface="Nirmala UI"/>
+        <a:font script="Tale" typeface="Microsoft Tai Le"/>
+        <a:font script="Talu" typeface="Microsoft New Tai Lue"/>
+        <a:font script="Tfng" typeface="Ebrima"/>
+      </a:majorFont>
+      <a:minorFont>
+        <a:latin typeface="Calibri" panose="020F0502020204030204"/>
+        <a:ea typeface=""/>
+        <a:cs typeface=""/>
+        <a:font script="Jpan" typeface="游ゴシック"/>
+        <a:font script="Hang" typeface="맑은 고딕"/>
+        <a:font script="Hans" typeface="等线"/>
+        <a:font script="Hant" typeface="新細明體"/>
+        <a:font script="Arab" typeface="Arial"/>
+        <a:font script="Hebr" typeface="Arial"/>
+        <a:font script="Thai" typeface="Cordia New"/>
+        <a:font script="Ethi" typeface="Nyala"/>
+        <a:font script="Beng" typeface="Vrinda"/>
+        <a:font script="Gujr" typeface="Shruti"/>
+        <a:font script="Khmr" typeface="DaunPenh"/>
+        <a:font script="Knda" typeface="Tunga"/>
+        <a:font script="Guru" typeface="Raavi"/>
+        <a:font script="Cans" typeface="Euphemia"/>
+        <a:font script="Cher" typeface="Plantagenet Cherokee"/>
+        <a:font script="Yiii" typeface="Microsoft Yi Baiti"/>
+        <a:font script="Tibt" typeface="Microsoft Himalaya"/>
+        <a:font script="Thaa" typeface="MV Boli"/>
+        <a:font script="Deva" typeface="Mangal"/>
+        <a:font script="Telu" typeface="Gautami"/>
+        <a:font script="Taml" typeface="Latha"/>
+        <a:font script="Syrc" typeface="Estrangelo Edessa"/>
+        <a:font script="Orya" typeface="Kalinga"/>
+        <a:font script="Mlym" typeface="Kartika"/>
+        <a:font script="Laoo" typeface="DokChampa"/>
+        <a:font script="Sinh" typeface="Iskoola Pota"/>
+        <a:font script="Mong" typeface="Mongolian Baiti"/>
+        <a:font script="Viet" typeface="Arial"/>
+        <a:font script="Uigh" typeface="Microsoft Uighur"/>
+        <a:font script="Geor" typeface="Sylfaen"/>
+        <a:font script="Armn" typeface="Arial"/>
+        <a:font script="Bugi" typeface="Leelawadee UI"/>
+        <a:font script="Bopo" typeface="Microsoft JhengHei"/>
+        <a:font script="Java" typeface="Javanese Text"/>
+        <a:font script="Lisu" typeface="Segoe UI"/>
+        <a:font script="Mymr" typeface="Myanmar Text"/>
+        <a:font script="Nkoo" typeface="Ebrima"/>
+        <a:font script="Olck" typeface="Nirmala UI"/>
+        <a:font script="Osma" typeface="Ebrima"/>
+        <a:font script="Phag" typeface="Phagspa"/>
+        <a:font script="Syrn" typeface="Estrangelo Edessa"/>
+        <a:font script="Syrj" typeface="Estrangelo Edessa"/>
+        <a:font script="Syre" typeface="Estrangelo Edessa"/>
+        <a:font script="Sora" typeface="Nirmala UI"/>
+        <a:font script="Tale" typeface="Microsoft Tai Le"/>
+        <a:font script="Talu" typeface="Microsoft New Tai Lue"/>
+        <a:font script="Tfng" typeface="Ebrima"/>
+      </a:minorFont>
+    </a:fontScheme>
+    <a:fmtScheme name="Office">
+      <a:fillStyleLst>
+        <a:solidFill>
+          <a:schemeClr val="phClr"/>
+        </a:solidFill>
+        <a:gradFill rotWithShape="1">
+          <a:gsLst>
+            <a:gs pos="0">
+              <a:schemeClr val="phClr">
+                <a:lumMod val="110000"/>
+                <a:satMod val="105000"/>
+                <a:tint val="67000"/>
+              </a:schemeClr>
+            </a:gs>
+            <a:gs pos="50000">
+              <a:schemeClr val="phClr">
+                <a:lumMod val="105000"/>
+                <a:satMod val="103000"/>
+                <a:tint val="73000"/>
+              </a:schemeClr>
+            </a:gs>
+            <a:gs pos="100000">
+              <a:schemeClr val="phClr">
+                <a:lumMod val="105000"/>
+                <a:satMod val="109000"/>
+                <a:tint val="81000"/>
+              </a:schemeClr>
+            </a:gs>
+          </a:gsLst>
+          <a:lin ang="5400000" scaled="0"/>
+        </a:gradFill>
+        <a:gradFill rotWithShape="1">
+          <a:gsLst>
+            <a:gs pos="0">
+              <a:schemeClr val="phClr">
+                <a:satMod val="103000"/>
+                <a:lumMod val="102000"/>
+                <a:tint val="94000"/>
+              </a:schemeClr>
+            </a:gs>
+            <a:gs pos="50000">
+              <a:schemeClr val="phClr">
+                <a:satMod val="110000"/>
+                <a:lumMod val="100000"/>
+                <a:shade val="100000"/>
+              </a:schemeClr>
+            </a:gs>
+            <a:gs pos="100000">
+              <a:schemeClr val="phClr">
+                <a:lumMod val="99000"/>
+                <a:satMod val="120000"/>
+                <a:shade val="78000"/>
+              </a:schemeClr>
+            </a:gs>
+          </a:gsLst>
+          <a:lin ang="5400000" scaled="0"/>
+        </a:gradFill>
+      </a:fillStyleLst>
+      <a:lnStyleLst>
+        <a:ln w="6350" cap="flat" cmpd="sng" algn="ctr">
+          <a:solidFill>
+            <a:schemeClr val="phClr"/>
+          </a:solidFill>
+          <a:prstDash val="solid"/>
+          <a:miter lim="800000"/>
+        </a:ln>
+        <a:ln w="12700" cap="flat" cmpd="sng" algn="ctr">
+          <a:solidFill>
+            <a:schemeClr val="phClr"/>
+          </a:solidFill>
+          <a:prstDash val="solid"/>
+          <a:miter lim="800000"/>
+        </a:ln>
+        <a:ln w="19050" cap="flat" cmpd="sng" algn="ctr">
+          <a:solidFill>
+            <a:schemeClr val="phClr"/>
+          </a:solidFill>
+          <a:prstDash val="solid"/>
+          <a:miter lim="800000"/>
+        </a:ln>
+      </a:lnStyleLst>
+      <a:effectStyleLst>
+        <a:effectStyle>
+          <a:effectLst/>
+        </a:effectStyle>
+        <a:effectStyle>
+          <a:effectLst/>
+        </a:effectStyle>
+        <a:effectStyle>
+          <a:effectLst>
+            <a:outerShdw blurRad="57150" dist="19050" dir="5400000" algn="ctr" rotWithShape="0">
+              <a:srgbClr val="000000">
+                <a:alpha val="63000"/>
+              </a:srgbClr>
+            </a:outerShdw>
+          </a:effectLst>
+        </a:effectStyle>
+      </a:effectStyleLst>
+      <a:bgFillStyleLst>
+        <a:solidFill>
+          <a:schemeClr val="phClr"/>
+        </a:solidFill>
+        <a:solidFill>
+          <a:schemeClr val="phClr">
+            <a:tint val="95000"/>
+            <a:satMod val="170000"/>
+          </a:schemeClr>
+        </a:solidFill>
+        <a:gradFill rotWithShape="1">
+          <a:gsLst>
+            <a:gs pos="0">
+              <a:schemeClr val="phClr">
+                <a:tint val="93000"/>
+                <a:satMod val="150000"/>
+                <a:shade val="98000"/>
+                <a:lumMod val="102000"/>
+              </a:schemeClr>
+            </a:gs>
+            <a:gs pos="50000">
+              <a:schemeClr val="phClr">
+                <a:tint val="98000"/>
+                <a:satMod val="130000"/>
+                <a:shade val="90000"/>
+                <a:lumMod val="103000"/>
+              </a:schemeClr>
+            </a:gs>
+            <a:gs pos="100000">
+              <a:schemeClr val="phClr">
+                <a:shade val="63000"/>
+                <a:satMod val="120000"/>
+              </a:schemeClr>
+            </a:gs>
+          </a:gsLst>
+          <a:lin ang="5400000" scaled="0"/>
+        </a:gradFill>
+      </a:bgFillStyleLst>
+    </a:fmtScheme>
+  </a:themeElements>
+  <a:objectDefaults/>
+  <a:extraClrSchemeLst/>
+  <a:extLst>
+    <a:ext uri="{05A4C25C-085E-4340-85A3-A5531E510DB2}">
+      <thm15:themeFamily xmlns:thm15="http://schemas.microsoft.com/office/thememl/2012/main" name="Office Theme" id="{62F939B6-93AF-4DB8-9C6B-D6C7DFDC589F}" vid="{4A3C46E8-61CC-4603-A589-7422A47A8E4A}"/>
+    </a:ext>
+  </a:extLst>
+</a:theme>
 </file>
</xml_diff>